<commit_message>
Update report - Tuan 3
</commit_message>
<xml_diff>
--- a/Report/SmartRecycleBin_Report_20220405_20220412.pptx
+++ b/Report/SmartRecycleBin_Report_20220405_20220412.pptx
@@ -5,15 +5,17 @@
     <p:sldMasterId id="2147483648" r:id="rId1"/>
   </p:sldMasterIdLst>
   <p:notesMasterIdLst>
-    <p:notesMasterId r:id="rId8"/>
+    <p:notesMasterId r:id="rId10"/>
   </p:notesMasterIdLst>
   <p:sldIdLst>
     <p:sldId id="256" r:id="rId2"/>
     <p:sldId id="257" r:id="rId3"/>
     <p:sldId id="259" r:id="rId4"/>
     <p:sldId id="260" r:id="rId5"/>
-    <p:sldId id="273" r:id="rId6"/>
-    <p:sldId id="263" r:id="rId7"/>
+    <p:sldId id="275" r:id="rId6"/>
+    <p:sldId id="273" r:id="rId7"/>
+    <p:sldId id="263" r:id="rId8"/>
+    <p:sldId id="274" r:id="rId9"/>
   </p:sldIdLst>
   <p:sldSz cx="12192000" cy="6858000"/>
   <p:notesSz cx="6858000" cy="9144000"/>
@@ -4711,117 +4713,6 @@
           <a:chExt cx="0" cy="0"/>
         </a:xfrm>
       </p:grpSpPr>
-      <p:grpSp>
-        <p:nvGrpSpPr>
-          <p:cNvPr id="12" name="Group 11">
-            <a:extLst>
-              <a:ext uri="{FF2B5EF4-FFF2-40B4-BE49-F238E27FC236}">
-                <a16:creationId xmlns:a16="http://schemas.microsoft.com/office/drawing/2014/main" id="{C83C3432-7CEB-4192-98DC-8C43B1525413}"/>
-              </a:ext>
-            </a:extLst>
-          </p:cNvPr>
-          <p:cNvGrpSpPr/>
-          <p:nvPr/>
-        </p:nvGrpSpPr>
-        <p:grpSpPr>
-          <a:xfrm>
-            <a:off x="1174458" y="3018465"/>
-            <a:ext cx="1468073" cy="606593"/>
-            <a:chOff x="3624044" y="3319455"/>
-            <a:chExt cx="1468073" cy="606593"/>
-          </a:xfrm>
-        </p:grpSpPr>
-        <p:sp>
-          <p:nvSpPr>
-            <p:cNvPr id="10" name="Multiplication Sign 9">
-              <a:extLst>
-                <a:ext uri="{FF2B5EF4-FFF2-40B4-BE49-F238E27FC236}">
-                  <a16:creationId xmlns:a16="http://schemas.microsoft.com/office/drawing/2014/main" id="{B869CE2F-8FD8-4497-AE9E-4158692588C6}"/>
-                </a:ext>
-              </a:extLst>
-            </p:cNvPr>
-            <p:cNvSpPr/>
-            <p:nvPr/>
-          </p:nvSpPr>
-          <p:spPr>
-            <a:xfrm>
-              <a:off x="3624044" y="3319455"/>
-              <a:ext cx="1468073" cy="606593"/>
-            </a:xfrm>
-            <a:prstGeom prst="mathMultiply">
-              <a:avLst/>
-            </a:prstGeom>
-          </p:spPr>
-          <p:style>
-            <a:lnRef idx="3">
-              <a:schemeClr val="lt1"/>
-            </a:lnRef>
-            <a:fillRef idx="1">
-              <a:schemeClr val="accent2"/>
-            </a:fillRef>
-            <a:effectRef idx="1">
-              <a:schemeClr val="accent2"/>
-            </a:effectRef>
-            <a:fontRef idx="minor">
-              <a:schemeClr val="lt1"/>
-            </a:fontRef>
-          </p:style>
-          <p:txBody>
-            <a:bodyPr rtlCol="0" anchor="ctr"/>
-            <a:lstStyle/>
-            <a:p>
-              <a:pPr algn="ctr"/>
-              <a:endParaRPr lang="en-US"/>
-            </a:p>
-          </p:txBody>
-        </p:sp>
-        <p:sp>
-          <p:nvSpPr>
-            <p:cNvPr id="11" name="Rectangle 10">
-              <a:extLst>
-                <a:ext uri="{FF2B5EF4-FFF2-40B4-BE49-F238E27FC236}">
-                  <a16:creationId xmlns:a16="http://schemas.microsoft.com/office/drawing/2014/main" id="{1876E429-9140-47DD-89D2-0D4EC51A3729}"/>
-                </a:ext>
-              </a:extLst>
-            </p:cNvPr>
-            <p:cNvSpPr/>
-            <p:nvPr/>
-          </p:nvSpPr>
-          <p:spPr>
-            <a:xfrm>
-              <a:off x="3717368" y="3730239"/>
-              <a:ext cx="1283516" cy="117446"/>
-            </a:xfrm>
-            <a:prstGeom prst="rect">
-              <a:avLst/>
-            </a:prstGeom>
-          </p:spPr>
-          <p:style>
-            <a:lnRef idx="2">
-              <a:schemeClr val="accent2">
-                <a:shade val="50000"/>
-              </a:schemeClr>
-            </a:lnRef>
-            <a:fillRef idx="1">
-              <a:schemeClr val="accent2"/>
-            </a:fillRef>
-            <a:effectRef idx="0">
-              <a:schemeClr val="accent2"/>
-            </a:effectRef>
-            <a:fontRef idx="minor">
-              <a:schemeClr val="lt1"/>
-            </a:fontRef>
-          </p:style>
-          <p:txBody>
-            <a:bodyPr rtlCol="0" anchor="ctr"/>
-            <a:lstStyle/>
-            <a:p>
-              <a:pPr algn="ctr"/>
-              <a:endParaRPr lang="en-US"/>
-            </a:p>
-          </p:txBody>
-        </p:sp>
-      </p:grpSp>
       <p:sp>
         <p:nvSpPr>
           <p:cNvPr id="2" name="Title 1">
@@ -4880,7 +4771,7 @@
         </p:nvSpPr>
         <p:spPr>
           <a:xfrm>
-            <a:off x="838200" y="1468073"/>
+            <a:off x="838200" y="1378098"/>
             <a:ext cx="10515600" cy="4708890"/>
           </a:xfrm>
         </p:spPr>
@@ -4890,115 +4781,19 @@
           <a:p>
             <a:r>
               <a:rPr lang="en-US" dirty="0" err="1"/>
-              <a:t>Phương</a:t>
-            </a:r>
-            <a:r>
-              <a:rPr lang="en-US" dirty="0"/>
-              <a:t> </a:t>
-            </a:r>
-            <a:r>
-              <a:rPr lang="en-US" dirty="0" err="1"/>
-              <a:t>án</a:t>
-            </a:r>
-            <a:r>
-              <a:rPr lang="en-US" dirty="0"/>
-              <a:t> </a:t>
-            </a:r>
-            <a:r>
-              <a:rPr lang="en-US" dirty="0" err="1"/>
-              <a:t>thiết</a:t>
-            </a:r>
-            <a:r>
-              <a:rPr lang="en-US" dirty="0"/>
-              <a:t> </a:t>
-            </a:r>
-            <a:r>
-              <a:rPr lang="en-US" dirty="0" err="1"/>
-              <a:t>kế</a:t>
-            </a:r>
-            <a:r>
-              <a:rPr lang="en-US" dirty="0"/>
-              <a:t> </a:t>
-            </a:r>
-            <a:r>
-              <a:rPr lang="en-US" dirty="0" err="1"/>
-              <a:t>bộ</a:t>
-            </a:r>
-            <a:r>
-              <a:rPr lang="en-US" dirty="0"/>
-              <a:t> </a:t>
-            </a:r>
-            <a:r>
-              <a:rPr lang="en-US" dirty="0" err="1"/>
-              <a:t>phận</a:t>
-            </a:r>
-            <a:r>
-              <a:rPr lang="en-US" dirty="0"/>
-              <a:t> </a:t>
-            </a:r>
-            <a:r>
-              <a:rPr lang="en-US" dirty="0" err="1"/>
-              <a:t>nén</a:t>
-            </a:r>
-            <a:r>
-              <a:rPr lang="en-US" dirty="0"/>
-              <a:t> </a:t>
-            </a:r>
-            <a:r>
-              <a:rPr lang="en-US" dirty="0" err="1"/>
-              <a:t>cho</a:t>
-            </a:r>
-            <a:r>
-              <a:rPr lang="en-US" dirty="0"/>
-              <a:t> </a:t>
-            </a:r>
-            <a:r>
-              <a:rPr lang="en-US" dirty="0" err="1"/>
-              <a:t>thùng</a:t>
-            </a:r>
-            <a:r>
-              <a:rPr lang="en-US" dirty="0"/>
-              <a:t> </a:t>
-            </a:r>
-            <a:r>
-              <a:rPr lang="en-US" dirty="0" err="1"/>
-              <a:t>rác</a:t>
-            </a:r>
-            <a:r>
-              <a:rPr lang="en-US" dirty="0"/>
-              <a:t> </a:t>
-            </a:r>
-            <a:r>
-              <a:rPr lang="en-US" dirty="0" err="1"/>
-              <a:t>túi</a:t>
-            </a:r>
-            <a:r>
-              <a:rPr lang="en-US" dirty="0"/>
-              <a:t> </a:t>
-            </a:r>
-            <a:r>
-              <a:rPr lang="en-US" dirty="0" err="1"/>
-              <a:t>nilon</a:t>
-            </a:r>
-            <a:r>
-              <a:rPr lang="en-US" dirty="0"/>
-              <a:t>: </a:t>
-            </a:r>
-            <a:r>
-              <a:rPr lang="en-US" dirty="0" err="1"/>
-              <a:t>Thiết</a:t>
-            </a:r>
-            <a:r>
-              <a:rPr lang="en-US" dirty="0"/>
-              <a:t> </a:t>
-            </a:r>
-            <a:r>
-              <a:rPr lang="en-US" dirty="0" err="1"/>
-              <a:t>kế</a:t>
-            </a:r>
-            <a:r>
-              <a:rPr lang="en-US" dirty="0"/>
-              <a:t> </a:t>
+              <a:t>Hoàn</a:t>
+            </a:r>
+            <a:r>
+              <a:rPr lang="en-US" dirty="0"/>
+              <a:t> </a:t>
+            </a:r>
+            <a:r>
+              <a:rPr lang="en-US" dirty="0" err="1"/>
+              <a:t>thiện</a:t>
+            </a:r>
+            <a:r>
+              <a:rPr lang="en-US" dirty="0"/>
+              <a:t> file </a:t>
             </a:r>
             <a:r>
               <a:rPr lang="en-US" dirty="0" err="1"/>
@@ -5006,55 +4801,15 @@
             </a:r>
             <a:r>
               <a:rPr lang="en-US" dirty="0"/>
-              <a:t> cấu </a:t>
-            </a:r>
-            <a:r>
-              <a:rPr lang="en-US" dirty="0" err="1"/>
-              <a:t>nén</a:t>
-            </a:r>
-            <a:r>
-              <a:rPr lang="en-US" dirty="0"/>
-              <a:t> </a:t>
-            </a:r>
-            <a:r>
-              <a:rPr lang="en-US" dirty="0" err="1"/>
-              <a:t>rác</a:t>
-            </a:r>
-            <a:r>
-              <a:rPr lang="en-US" dirty="0"/>
-              <a:t> </a:t>
-            </a:r>
-            <a:r>
-              <a:rPr lang="en-US" dirty="0" err="1"/>
-              <a:t>theo</a:t>
-            </a:r>
-            <a:r>
-              <a:rPr lang="en-US" dirty="0"/>
-              <a:t> </a:t>
-            </a:r>
-            <a:r>
-              <a:rPr lang="en-US" dirty="0" err="1"/>
-              <a:t>cơ</a:t>
-            </a:r>
-            <a:r>
-              <a:rPr lang="en-US" dirty="0"/>
-              <a:t> cấu </a:t>
-            </a:r>
-            <a:r>
-              <a:rPr lang="en-US" dirty="0" err="1"/>
-              <a:t>hình</a:t>
-            </a:r>
-            <a:r>
-              <a:rPr lang="en-US" dirty="0"/>
-              <a:t> </a:t>
-            </a:r>
-            <a:r>
-              <a:rPr lang="en-US" dirty="0" err="1"/>
-              <a:t>chữ</a:t>
-            </a:r>
-            <a:r>
-              <a:rPr lang="en-US" dirty="0"/>
-              <a:t> X:</a:t>
+              <a:t> </a:t>
+            </a:r>
+            <a:r>
+              <a:rPr lang="en-US" dirty="0" err="1"/>
+              <a:t>khí</a:t>
+            </a:r>
+            <a:r>
+              <a:rPr lang="en-US" dirty="0"/>
+              <a:t>:</a:t>
             </a:r>
           </a:p>
           <a:p>
@@ -5094,423 +4849,6 @@
           </a:p>
         </p:txBody>
       </p:sp>
-      <p:sp>
-        <p:nvSpPr>
-          <p:cNvPr id="5" name="Rectangle 4">
-            <a:extLst>
-              <a:ext uri="{FF2B5EF4-FFF2-40B4-BE49-F238E27FC236}">
-                <a16:creationId xmlns:a16="http://schemas.microsoft.com/office/drawing/2014/main" id="{EEDCD69D-9CF2-4CA7-A989-898C6618BEAC}"/>
-              </a:ext>
-            </a:extLst>
-          </p:cNvPr>
-          <p:cNvSpPr/>
-          <p:nvPr/>
-        </p:nvSpPr>
-        <p:spPr>
-          <a:xfrm>
-            <a:off x="1031846" y="2885812"/>
-            <a:ext cx="1761688" cy="3126589"/>
-          </a:xfrm>
-          <a:prstGeom prst="rect">
-            <a:avLst/>
-          </a:prstGeom>
-          <a:noFill/>
-          <a:ln w="9525" cap="flat" cmpd="sng" algn="ctr">
-            <a:solidFill>
-              <a:schemeClr val="dk1"/>
-            </a:solidFill>
-            <a:prstDash val="solid"/>
-            <a:round/>
-            <a:headEnd type="none" w="med" len="med"/>
-            <a:tailEnd type="none" w="med" len="med"/>
-          </a:ln>
-        </p:spPr>
-        <p:style>
-          <a:lnRef idx="0">
-            <a:scrgbClr r="0" g="0" b="0"/>
-          </a:lnRef>
-          <a:fillRef idx="0">
-            <a:scrgbClr r="0" g="0" b="0"/>
-          </a:fillRef>
-          <a:effectRef idx="0">
-            <a:scrgbClr r="0" g="0" b="0"/>
-          </a:effectRef>
-          <a:fontRef idx="minor">
-            <a:schemeClr val="dk1"/>
-          </a:fontRef>
-        </p:style>
-        <p:txBody>
-          <a:bodyPr rtlCol="0" anchor="ctr"/>
-          <a:lstStyle/>
-          <a:p>
-            <a:pPr algn="ctr"/>
-            <a:endParaRPr lang="en-US"/>
-          </a:p>
-        </p:txBody>
-      </p:sp>
-      <p:sp>
-        <p:nvSpPr>
-          <p:cNvPr id="6" name="Rectangle 5">
-            <a:extLst>
-              <a:ext uri="{FF2B5EF4-FFF2-40B4-BE49-F238E27FC236}">
-                <a16:creationId xmlns:a16="http://schemas.microsoft.com/office/drawing/2014/main" id="{403DF527-2D26-4B21-967E-40F02DC31E27}"/>
-              </a:ext>
-            </a:extLst>
-          </p:cNvPr>
-          <p:cNvSpPr/>
-          <p:nvPr/>
-        </p:nvSpPr>
-        <p:spPr>
-          <a:xfrm>
-            <a:off x="1090569" y="2975506"/>
-            <a:ext cx="1635853" cy="858262"/>
-          </a:xfrm>
-          <a:prstGeom prst="rect">
-            <a:avLst/>
-          </a:prstGeom>
-          <a:noFill/>
-          <a:ln w="9525" cap="flat" cmpd="sng" algn="ctr">
-            <a:solidFill>
-              <a:schemeClr val="dk1"/>
-            </a:solidFill>
-            <a:prstDash val="solid"/>
-            <a:round/>
-            <a:headEnd type="none" w="med" len="med"/>
-            <a:tailEnd type="none" w="med" len="med"/>
-          </a:ln>
-        </p:spPr>
-        <p:style>
-          <a:lnRef idx="0">
-            <a:scrgbClr r="0" g="0" b="0"/>
-          </a:lnRef>
-          <a:fillRef idx="0">
-            <a:scrgbClr r="0" g="0" b="0"/>
-          </a:fillRef>
-          <a:effectRef idx="0">
-            <a:scrgbClr r="0" g="0" b="0"/>
-          </a:effectRef>
-          <a:fontRef idx="minor">
-            <a:schemeClr val="dk1"/>
-          </a:fontRef>
-        </p:style>
-        <p:txBody>
-          <a:bodyPr rtlCol="0" anchor="ctr"/>
-          <a:lstStyle/>
-          <a:p>
-            <a:pPr algn="ctr"/>
-            <a:endParaRPr lang="en-US" dirty="0"/>
-          </a:p>
-        </p:txBody>
-      </p:sp>
-      <p:sp>
-        <p:nvSpPr>
-          <p:cNvPr id="7" name="Rectangle 6">
-            <a:extLst>
-              <a:ext uri="{FF2B5EF4-FFF2-40B4-BE49-F238E27FC236}">
-                <a16:creationId xmlns:a16="http://schemas.microsoft.com/office/drawing/2014/main" id="{4D88F75D-E6E0-4EEB-BE80-3D92EB5E5FF0}"/>
-              </a:ext>
-            </a:extLst>
-          </p:cNvPr>
-          <p:cNvSpPr/>
-          <p:nvPr/>
-        </p:nvSpPr>
-        <p:spPr>
-          <a:xfrm>
-            <a:off x="1090569" y="3923462"/>
-            <a:ext cx="1635853" cy="1999246"/>
-          </a:xfrm>
-          <a:prstGeom prst="rect">
-            <a:avLst/>
-          </a:prstGeom>
-        </p:spPr>
-        <p:style>
-          <a:lnRef idx="2">
-            <a:schemeClr val="dk1"/>
-          </a:lnRef>
-          <a:fillRef idx="1">
-            <a:schemeClr val="lt1"/>
-          </a:fillRef>
-          <a:effectRef idx="0">
-            <a:schemeClr val="dk1"/>
-          </a:effectRef>
-          <a:fontRef idx="minor">
-            <a:schemeClr val="dk1"/>
-          </a:fontRef>
-        </p:style>
-        <p:txBody>
-          <a:bodyPr rtlCol="0" anchor="ctr"/>
-          <a:lstStyle/>
-          <a:p>
-            <a:pPr algn="ctr"/>
-            <a:r>
-              <a:rPr lang="en-US" dirty="0" err="1"/>
-              <a:t>Thùng</a:t>
-            </a:r>
-            <a:r>
-              <a:rPr lang="en-US" dirty="0"/>
-              <a:t> </a:t>
-            </a:r>
-            <a:r>
-              <a:rPr lang="en-US" dirty="0" err="1"/>
-              <a:t>rác</a:t>
-            </a:r>
-            <a:r>
-              <a:rPr lang="en-US" dirty="0"/>
-              <a:t> </a:t>
-            </a:r>
-            <a:r>
-              <a:rPr lang="en-US" dirty="0" err="1"/>
-              <a:t>nilon</a:t>
-            </a:r>
-            <a:endParaRPr lang="en-US" dirty="0"/>
-          </a:p>
-        </p:txBody>
-      </p:sp>
-      <p:sp>
-        <p:nvSpPr>
-          <p:cNvPr id="8" name="Rectangle: Rounded Corners 7">
-            <a:extLst>
-              <a:ext uri="{FF2B5EF4-FFF2-40B4-BE49-F238E27FC236}">
-                <a16:creationId xmlns:a16="http://schemas.microsoft.com/office/drawing/2014/main" id="{E4F36C1B-0F70-48AA-8654-74A3C3E98147}"/>
-              </a:ext>
-            </a:extLst>
-          </p:cNvPr>
-          <p:cNvSpPr/>
-          <p:nvPr/>
-        </p:nvSpPr>
-        <p:spPr>
-          <a:xfrm>
-            <a:off x="1644242" y="3085051"/>
-            <a:ext cx="553674" cy="102765"/>
-          </a:xfrm>
-          <a:prstGeom prst="roundRect">
-            <a:avLst/>
-          </a:prstGeom>
-        </p:spPr>
-        <p:style>
-          <a:lnRef idx="2">
-            <a:schemeClr val="accent1">
-              <a:shade val="50000"/>
-            </a:schemeClr>
-          </a:lnRef>
-          <a:fillRef idx="1">
-            <a:schemeClr val="accent1"/>
-          </a:fillRef>
-          <a:effectRef idx="0">
-            <a:schemeClr val="accent1"/>
-          </a:effectRef>
-          <a:fontRef idx="minor">
-            <a:schemeClr val="lt1"/>
-          </a:fontRef>
-        </p:style>
-        <p:txBody>
-          <a:bodyPr rtlCol="0" anchor="ctr"/>
-          <a:lstStyle/>
-          <a:p>
-            <a:pPr algn="ctr"/>
-            <a:endParaRPr lang="en-US"/>
-          </a:p>
-        </p:txBody>
-      </p:sp>
-      <p:sp>
-        <p:nvSpPr>
-          <p:cNvPr id="9" name="Rectangle: Rounded Corners 8">
-            <a:extLst>
-              <a:ext uri="{FF2B5EF4-FFF2-40B4-BE49-F238E27FC236}">
-                <a16:creationId xmlns:a16="http://schemas.microsoft.com/office/drawing/2014/main" id="{B6C89C7E-2C9C-45E2-8C2E-8456062D7188}"/>
-              </a:ext>
-            </a:extLst>
-          </p:cNvPr>
-          <p:cNvSpPr/>
-          <p:nvPr/>
-        </p:nvSpPr>
-        <p:spPr>
-          <a:xfrm>
-            <a:off x="1439409" y="3297361"/>
-            <a:ext cx="996891" cy="397079"/>
-          </a:xfrm>
-          <a:prstGeom prst="roundRect">
-            <a:avLst/>
-          </a:prstGeom>
-        </p:spPr>
-        <p:style>
-          <a:lnRef idx="2">
-            <a:schemeClr val="accent1">
-              <a:shade val="50000"/>
-            </a:schemeClr>
-          </a:lnRef>
-          <a:fillRef idx="1">
-            <a:schemeClr val="accent1"/>
-          </a:fillRef>
-          <a:effectRef idx="0">
-            <a:schemeClr val="accent1"/>
-          </a:effectRef>
-          <a:fontRef idx="minor">
-            <a:schemeClr val="lt1"/>
-          </a:fontRef>
-        </p:style>
-        <p:txBody>
-          <a:bodyPr rtlCol="0" anchor="ctr"/>
-          <a:lstStyle/>
-          <a:p>
-            <a:pPr algn="ctr"/>
-            <a:endParaRPr lang="en-US"/>
-          </a:p>
-        </p:txBody>
-      </p:sp>
-      <p:sp>
-        <p:nvSpPr>
-          <p:cNvPr id="13" name="Oval 12">
-            <a:extLst>
-              <a:ext uri="{FF2B5EF4-FFF2-40B4-BE49-F238E27FC236}">
-                <a16:creationId xmlns:a16="http://schemas.microsoft.com/office/drawing/2014/main" id="{B98DC77D-EFFB-4235-8420-7763033EC5B5}"/>
-              </a:ext>
-            </a:extLst>
-          </p:cNvPr>
-          <p:cNvSpPr/>
-          <p:nvPr/>
-        </p:nvSpPr>
-        <p:spPr>
-          <a:xfrm>
-            <a:off x="1174458" y="3018465"/>
-            <a:ext cx="1468073" cy="725610"/>
-          </a:xfrm>
-          <a:prstGeom prst="ellipse">
-            <a:avLst/>
-          </a:prstGeom>
-          <a:noFill/>
-          <a:ln w="28575" cap="flat" cmpd="sng" algn="ctr">
-            <a:solidFill>
-              <a:schemeClr val="accent2"/>
-            </a:solidFill>
-            <a:prstDash val="solid"/>
-            <a:round/>
-            <a:headEnd type="none" w="med" len="med"/>
-            <a:tailEnd type="none" w="med" len="med"/>
-          </a:ln>
-        </p:spPr>
-        <p:style>
-          <a:lnRef idx="0">
-            <a:scrgbClr r="0" g="0" b="0"/>
-          </a:lnRef>
-          <a:fillRef idx="0">
-            <a:scrgbClr r="0" g="0" b="0"/>
-          </a:fillRef>
-          <a:effectRef idx="0">
-            <a:scrgbClr r="0" g="0" b="0"/>
-          </a:effectRef>
-          <a:fontRef idx="minor">
-            <a:schemeClr val="accent2"/>
-          </a:fontRef>
-        </p:style>
-        <p:txBody>
-          <a:bodyPr rtlCol="0" anchor="ctr"/>
-          <a:lstStyle/>
-          <a:p>
-            <a:pPr algn="ctr"/>
-            <a:endParaRPr lang="en-US"/>
-          </a:p>
-        </p:txBody>
-      </p:sp>
-      <p:pic>
-        <p:nvPicPr>
-          <p:cNvPr id="17" name="Picture 16">
-            <a:extLst>
-              <a:ext uri="{FF2B5EF4-FFF2-40B4-BE49-F238E27FC236}">
-                <a16:creationId xmlns:a16="http://schemas.microsoft.com/office/drawing/2014/main" id="{70D8CC74-020E-4913-AB73-B131689A5974}"/>
-              </a:ext>
-            </a:extLst>
-          </p:cNvPr>
-          <p:cNvPicPr>
-            <a:picLocks noChangeAspect="1"/>
-          </p:cNvPicPr>
-          <p:nvPr/>
-        </p:nvPicPr>
-        <p:blipFill rotWithShape="1">
-          <a:blip r:embed="rId2"/>
-          <a:srcRect l="3704" t="17859" r="1590" b="29052"/>
-          <a:stretch/>
-        </p:blipFill>
-        <p:spPr>
-          <a:xfrm>
-            <a:off x="3833770" y="2975509"/>
-            <a:ext cx="2013973" cy="2853234"/>
-          </a:xfrm>
-          <a:prstGeom prst="rect">
-            <a:avLst/>
-          </a:prstGeom>
-        </p:spPr>
-      </p:pic>
-      <p:cxnSp>
-        <p:nvCxnSpPr>
-          <p:cNvPr id="19" name="Straight Arrow Connector 18">
-            <a:extLst>
-              <a:ext uri="{FF2B5EF4-FFF2-40B4-BE49-F238E27FC236}">
-                <a16:creationId xmlns:a16="http://schemas.microsoft.com/office/drawing/2014/main" id="{949637AC-7600-4598-AEBA-F7A9EE78EAF1}"/>
-              </a:ext>
-            </a:extLst>
-          </p:cNvPr>
-          <p:cNvCxnSpPr>
-            <a:stCxn id="13" idx="6"/>
-          </p:cNvCxnSpPr>
-          <p:nvPr/>
-        </p:nvCxnSpPr>
-        <p:spPr>
-          <a:xfrm>
-            <a:off x="2642531" y="3381270"/>
-            <a:ext cx="964735" cy="0"/>
-          </a:xfrm>
-          <a:prstGeom prst="straightConnector1">
-            <a:avLst/>
-          </a:prstGeom>
-          <a:ln w="38100">
-            <a:tailEnd type="triangle"/>
-          </a:ln>
-        </p:spPr>
-        <p:style>
-          <a:lnRef idx="1">
-            <a:schemeClr val="accent2"/>
-          </a:lnRef>
-          <a:fillRef idx="0">
-            <a:schemeClr val="accent2"/>
-          </a:fillRef>
-          <a:effectRef idx="0">
-            <a:schemeClr val="accent2"/>
-          </a:effectRef>
-          <a:fontRef idx="minor">
-            <a:schemeClr val="tx1"/>
-          </a:fontRef>
-        </p:style>
-      </p:cxnSp>
-      <p:pic>
-        <p:nvPicPr>
-          <p:cNvPr id="21" name="Picture 20">
-            <a:extLst>
-              <a:ext uri="{FF2B5EF4-FFF2-40B4-BE49-F238E27FC236}">
-                <a16:creationId xmlns:a16="http://schemas.microsoft.com/office/drawing/2014/main" id="{F4E729AD-254C-4D57-B022-B448AC699017}"/>
-              </a:ext>
-            </a:extLst>
-          </p:cNvPr>
-          <p:cNvPicPr>
-            <a:picLocks noChangeAspect="1"/>
-          </p:cNvPicPr>
-          <p:nvPr/>
-        </p:nvPicPr>
-        <p:blipFill rotWithShape="1">
-          <a:blip r:embed="rId3"/>
-          <a:srcRect t="29970" r="2470" b="36635"/>
-          <a:stretch/>
-        </p:blipFill>
-        <p:spPr>
-          <a:xfrm>
-            <a:off x="6263792" y="2961360"/>
-            <a:ext cx="4488799" cy="2853234"/>
-          </a:xfrm>
-          <a:prstGeom prst="rect">
-            <a:avLst/>
-          </a:prstGeom>
-        </p:spPr>
-      </p:pic>
       <p:sp>
         <p:nvSpPr>
           <p:cNvPr id="22" name="TextBox 21">
@@ -5545,7 +4883,7 @@
             </a:r>
             <a:r>
               <a:rPr lang="en-US" i="1" dirty="0"/>
-              <a:t> 4: </a:t>
+              <a:t> 1: </a:t>
             </a:r>
             <a:r>
               <a:rPr lang="en-US" i="1" dirty="0" err="1"/>
@@ -5577,11 +4915,11 @@
             </a:r>
             <a:r>
               <a:rPr lang="en-US" i="1" dirty="0"/>
-              <a:t> ý </a:t>
+              <a:t> </a:t>
             </a:r>
             <a:r>
               <a:rPr lang="en-US" i="1" dirty="0" err="1"/>
-              <a:t>tưởng</a:t>
+              <a:t>bản</a:t>
             </a:r>
             <a:r>
               <a:rPr lang="en-US" i="1" dirty="0"/>
@@ -5589,15 +4927,7 @@
             </a:r>
             <a:r>
               <a:rPr lang="en-US" i="1" dirty="0" err="1"/>
-              <a:t>thiết</a:t>
-            </a:r>
-            <a:r>
-              <a:rPr lang="en-US" i="1" dirty="0"/>
-              <a:t> </a:t>
-            </a:r>
-            <a:r>
-              <a:rPr lang="en-US" i="1" dirty="0" err="1"/>
-              <a:t>kế</a:t>
+              <a:t>vẽ</a:t>
             </a:r>
             <a:r>
               <a:rPr lang="en-US" i="1" dirty="0"/>
@@ -5613,7 +4943,7 @@
             </a:r>
             <a:r>
               <a:rPr lang="en-US" i="1" dirty="0" err="1"/>
-              <a:t>chế</a:t>
+              <a:t>khí</a:t>
             </a:r>
             <a:r>
               <a:rPr lang="en-US" i="1" dirty="0"/>
@@ -5621,7 +4951,15 @@
             </a:r>
             <a:r>
               <a:rPr lang="en-US" i="1" dirty="0" err="1"/>
-              <a:t>nén</a:t>
+              <a:t>tổng</a:t>
+            </a:r>
+            <a:r>
+              <a:rPr lang="en-US" i="1" dirty="0"/>
+              <a:t> </a:t>
+            </a:r>
+            <a:r>
+              <a:rPr lang="en-US" i="1" dirty="0" err="1"/>
+              <a:t>quát</a:t>
             </a:r>
             <a:r>
               <a:rPr lang="en-US" i="1" dirty="0"/>
@@ -5646,6 +4984,66 @@
           </a:p>
         </p:txBody>
       </p:sp>
+      <p:pic>
+        <p:nvPicPr>
+          <p:cNvPr id="16" name="Picture 15">
+            <a:extLst>
+              <a:ext uri="{FF2B5EF4-FFF2-40B4-BE49-F238E27FC236}">
+                <a16:creationId xmlns:a16="http://schemas.microsoft.com/office/drawing/2014/main" id="{94887476-B35D-4702-9594-E8FEA66B7F43}"/>
+              </a:ext>
+            </a:extLst>
+          </p:cNvPr>
+          <p:cNvPicPr>
+            <a:picLocks noChangeAspect="1"/>
+          </p:cNvPicPr>
+          <p:nvPr/>
+        </p:nvPicPr>
+        <p:blipFill>
+          <a:blip r:embed="rId2"/>
+          <a:stretch>
+            <a:fillRect/>
+          </a:stretch>
+        </p:blipFill>
+        <p:spPr>
+          <a:xfrm>
+            <a:off x="838200" y="2276871"/>
+            <a:ext cx="3892461" cy="2458854"/>
+          </a:xfrm>
+          <a:prstGeom prst="rect">
+            <a:avLst/>
+          </a:prstGeom>
+        </p:spPr>
+      </p:pic>
+      <p:pic>
+        <p:nvPicPr>
+          <p:cNvPr id="23" name="Picture 22">
+            <a:extLst>
+              <a:ext uri="{FF2B5EF4-FFF2-40B4-BE49-F238E27FC236}">
+                <a16:creationId xmlns:a16="http://schemas.microsoft.com/office/drawing/2014/main" id="{B242B24D-329C-44BA-B51D-A43C32E01EEA}"/>
+              </a:ext>
+            </a:extLst>
+          </p:cNvPr>
+          <p:cNvPicPr>
+            <a:picLocks noChangeAspect="1"/>
+          </p:cNvPicPr>
+          <p:nvPr/>
+        </p:nvPicPr>
+        <p:blipFill>
+          <a:blip r:embed="rId3"/>
+          <a:stretch>
+            <a:fillRect/>
+          </a:stretch>
+        </p:blipFill>
+        <p:spPr>
+          <a:xfrm>
+            <a:off x="4730661" y="1160859"/>
+            <a:ext cx="6712513" cy="4656767"/>
+          </a:xfrm>
+          <a:prstGeom prst="rect">
+            <a:avLst/>
+          </a:prstGeom>
+        </p:spPr>
+      </p:pic>
     </p:spTree>
     <p:extLst>
       <p:ext uri="{BB962C8B-B14F-4D97-AF65-F5344CB8AC3E}">
@@ -5681,7 +5079,7 @@
           <p:cNvPr id="2" name="Title 1">
             <a:extLst>
               <a:ext uri="{FF2B5EF4-FFF2-40B4-BE49-F238E27FC236}">
-                <a16:creationId xmlns:a16="http://schemas.microsoft.com/office/drawing/2014/main" id="{B3E0762C-3E4E-4E5B-BC04-55322D9E4095}"/>
+                <a16:creationId xmlns:a16="http://schemas.microsoft.com/office/drawing/2014/main" id="{6821A5F8-1BCD-4078-A1D2-34F1DC562070}"/>
               </a:ext>
             </a:extLst>
           </p:cNvPr>
@@ -5690,12 +5088,52 @@
           </p:cNvSpPr>
           <p:nvPr>
             <p:ph type="title"/>
+          </p:nvPr>
+        </p:nvSpPr>
+        <p:spPr/>
+        <p:txBody>
+          <a:bodyPr/>
+          <a:lstStyle/>
+          <a:p>
+            <a:r>
+              <a:rPr lang="en-US" b="1" dirty="0" err="1"/>
+              <a:t>Kết</a:t>
+            </a:r>
+            <a:r>
+              <a:rPr lang="en-US" b="1" dirty="0"/>
+              <a:t> </a:t>
+            </a:r>
+            <a:r>
+              <a:rPr lang="en-US" b="1" dirty="0" err="1"/>
+              <a:t>quả</a:t>
+            </a:r>
+            <a:r>
+              <a:rPr lang="en-US" b="1" dirty="0"/>
+              <a:t>:</a:t>
+            </a:r>
+          </a:p>
+        </p:txBody>
+      </p:sp>
+      <p:sp>
+        <p:nvSpPr>
+          <p:cNvPr id="3" name="Content Placeholder 2">
+            <a:extLst>
+              <a:ext uri="{FF2B5EF4-FFF2-40B4-BE49-F238E27FC236}">
+                <a16:creationId xmlns:a16="http://schemas.microsoft.com/office/drawing/2014/main" id="{44ECE8EA-C869-427C-825B-EDE090DCD0B5}"/>
+              </a:ext>
+            </a:extLst>
+          </p:cNvPr>
+          <p:cNvSpPr>
+            <a:spLocks noGrp="1"/>
+          </p:cNvSpPr>
+          <p:nvPr>
+            <p:ph idx="1"/>
           </p:nvPr>
         </p:nvSpPr>
         <p:spPr>
           <a:xfrm>
-            <a:off x="772886" y="365125"/>
-            <a:ext cx="10515600" cy="829193"/>
+            <a:off x="838200" y="1378098"/>
+            <a:ext cx="10515600" cy="4708890"/>
           </a:xfrm>
         </p:spPr>
         <p:txBody>
@@ -5703,87 +5141,32 @@
           <a:lstStyle/>
           <a:p>
             <a:r>
-              <a:rPr lang="en-US" b="1" dirty="0" err="1"/>
-              <a:t>Vấn</a:t>
-            </a:r>
-            <a:r>
-              <a:rPr lang="en-US" b="1" dirty="0"/>
-              <a:t> đề </a:t>
-            </a:r>
-            <a:r>
-              <a:rPr lang="en-US" b="1" dirty="0" err="1"/>
-              <a:t>còn</a:t>
-            </a:r>
-            <a:r>
-              <a:rPr lang="en-US" b="1" dirty="0"/>
-              <a:t> </a:t>
-            </a:r>
-            <a:r>
-              <a:rPr lang="en-US" b="1" dirty="0" err="1"/>
-              <a:t>gặp</a:t>
-            </a:r>
-            <a:r>
-              <a:rPr lang="en-US" b="1" dirty="0"/>
-              <a:t> phải.</a:t>
-            </a:r>
-          </a:p>
-        </p:txBody>
-      </p:sp>
-      <p:sp>
-        <p:nvSpPr>
-          <p:cNvPr id="3" name="Content Placeholder 2">
-            <a:extLst>
-              <a:ext uri="{FF2B5EF4-FFF2-40B4-BE49-F238E27FC236}">
-                <a16:creationId xmlns:a16="http://schemas.microsoft.com/office/drawing/2014/main" id="{27646CDC-FAF8-4288-8291-4771C175B291}"/>
-              </a:ext>
-            </a:extLst>
-          </p:cNvPr>
-          <p:cNvSpPr>
-            <a:spLocks noGrp="1"/>
-          </p:cNvSpPr>
-          <p:nvPr>
-            <p:ph idx="1"/>
-          </p:nvPr>
-        </p:nvSpPr>
-        <p:spPr>
-          <a:xfrm>
-            <a:off x="838200" y="1350628"/>
-            <a:ext cx="10515600" cy="4826335"/>
-          </a:xfrm>
-        </p:spPr>
-        <p:txBody>
-          <a:bodyPr>
-            <a:normAutofit/>
-          </a:bodyPr>
-          <a:lstStyle/>
-          <a:p>
-            <a:r>
-              <a:rPr lang="en-US" dirty="0" err="1"/>
-              <a:t>Tiến</a:t>
-            </a:r>
-            <a:r>
-              <a:rPr lang="en-US" dirty="0"/>
-              <a:t> </a:t>
-            </a:r>
-            <a:r>
-              <a:rPr lang="en-US" dirty="0" err="1"/>
-              <a:t>độ</a:t>
-            </a:r>
-            <a:r>
-              <a:rPr lang="en-US" dirty="0"/>
-              <a:t> </a:t>
-            </a:r>
-            <a:r>
-              <a:rPr lang="en-US" dirty="0" err="1"/>
-              <a:t>dự</a:t>
-            </a:r>
-            <a:r>
-              <a:rPr lang="en-US" dirty="0"/>
-              <a:t> </a:t>
-            </a:r>
-            <a:r>
-              <a:rPr lang="en-US" dirty="0" err="1"/>
-              <a:t>án</a:t>
+              <a:rPr lang="en-US" dirty="0" err="1"/>
+              <a:t>Hoàn</a:t>
+            </a:r>
+            <a:r>
+              <a:rPr lang="en-US" dirty="0"/>
+              <a:t> </a:t>
+            </a:r>
+            <a:r>
+              <a:rPr lang="en-US" dirty="0" err="1"/>
+              <a:t>thiện</a:t>
+            </a:r>
+            <a:r>
+              <a:rPr lang="en-US" dirty="0"/>
+              <a:t> file </a:t>
+            </a:r>
+            <a:r>
+              <a:rPr lang="en-US" dirty="0" err="1"/>
+              <a:t>cơ</a:t>
+            </a:r>
+            <a:r>
+              <a:rPr lang="en-US" dirty="0"/>
+              <a:t> </a:t>
+            </a:r>
+            <a:r>
+              <a:rPr lang="en-US" dirty="0" err="1"/>
+              <a:t>khí</a:t>
             </a:r>
             <a:r>
               <a:rPr lang="en-US" dirty="0"/>
@@ -5791,709 +5174,10 @@
             </a:r>
           </a:p>
           <a:p>
-            <a:pPr marL="457200" lvl="1" indent="0">
+            <a:pPr marL="0" indent="0">
               <a:buNone/>
             </a:pPr>
-            <a:r>
-              <a:rPr lang="en-US" dirty="0" err="1"/>
-              <a:t>Hiện</a:t>
-            </a:r>
-            <a:r>
-              <a:rPr lang="en-US" dirty="0"/>
-              <a:t> </a:t>
-            </a:r>
-            <a:r>
-              <a:rPr lang="en-US" dirty="0" err="1"/>
-              <a:t>tại</a:t>
-            </a:r>
-            <a:r>
-              <a:rPr lang="en-US" dirty="0"/>
-              <a:t> </a:t>
-            </a:r>
-            <a:r>
-              <a:rPr lang="en-US" dirty="0" err="1"/>
-              <a:t>tiến</a:t>
-            </a:r>
-            <a:r>
-              <a:rPr lang="en-US" dirty="0"/>
-              <a:t> </a:t>
-            </a:r>
-            <a:r>
-              <a:rPr lang="en-US" dirty="0" err="1"/>
-              <a:t>độ</a:t>
-            </a:r>
-            <a:r>
-              <a:rPr lang="en-US" dirty="0"/>
-              <a:t> </a:t>
-            </a:r>
-            <a:r>
-              <a:rPr lang="en-US" dirty="0" err="1"/>
-              <a:t>dự</a:t>
-            </a:r>
-            <a:r>
-              <a:rPr lang="en-US" dirty="0"/>
-              <a:t> </a:t>
-            </a:r>
-            <a:r>
-              <a:rPr lang="en-US" dirty="0" err="1"/>
-              <a:t>án</a:t>
-            </a:r>
-            <a:r>
-              <a:rPr lang="en-US" dirty="0"/>
-              <a:t> </a:t>
-            </a:r>
-            <a:r>
-              <a:rPr lang="en-US" dirty="0" err="1"/>
-              <a:t>chậm</a:t>
-            </a:r>
-            <a:r>
-              <a:rPr lang="en-US" dirty="0"/>
-              <a:t> </a:t>
-            </a:r>
-            <a:r>
-              <a:rPr lang="en-US" dirty="0" err="1"/>
-              <a:t>hơn</a:t>
-            </a:r>
-            <a:r>
-              <a:rPr lang="en-US" dirty="0"/>
-              <a:t> so với </a:t>
-            </a:r>
-            <a:r>
-              <a:rPr lang="en-US" dirty="0" err="1"/>
-              <a:t>kế</a:t>
-            </a:r>
-            <a:r>
-              <a:rPr lang="en-US" dirty="0"/>
-              <a:t> </a:t>
-            </a:r>
-            <a:r>
-              <a:rPr lang="en-US" dirty="0" err="1"/>
-              <a:t>hoạch</a:t>
-            </a:r>
-            <a:r>
-              <a:rPr lang="en-US" dirty="0"/>
-              <a:t> </a:t>
-            </a:r>
-            <a:r>
-              <a:rPr lang="en-US" dirty="0" err="1"/>
-              <a:t>đặt</a:t>
-            </a:r>
-            <a:r>
-              <a:rPr lang="en-US" dirty="0"/>
-              <a:t> </a:t>
-            </a:r>
-            <a:r>
-              <a:rPr lang="en-US" dirty="0" err="1"/>
-              <a:t>ra</a:t>
-            </a:r>
-            <a:r>
-              <a:rPr lang="en-US" dirty="0"/>
-              <a:t>, </a:t>
-            </a:r>
-            <a:r>
-              <a:rPr lang="en-US" dirty="0" err="1"/>
-              <a:t>cụ</a:t>
-            </a:r>
-            <a:r>
-              <a:rPr lang="en-US" dirty="0"/>
-              <a:t> thể:</a:t>
-            </a:r>
-          </a:p>
-          <a:p>
-            <a:pPr marL="914400" lvl="2" indent="0">
-              <a:buNone/>
-            </a:pPr>
-            <a:r>
-              <a:rPr lang="en-US" dirty="0" err="1"/>
-              <a:t>Kế</a:t>
-            </a:r>
-            <a:r>
-              <a:rPr lang="en-US" dirty="0"/>
-              <a:t> </a:t>
-            </a:r>
-            <a:r>
-              <a:rPr lang="en-US" dirty="0" err="1"/>
-              <a:t>hoạch</a:t>
-            </a:r>
-            <a:r>
-              <a:rPr lang="en-US" dirty="0"/>
-              <a:t> </a:t>
-            </a:r>
-            <a:r>
-              <a:rPr lang="en-US" dirty="0" err="1"/>
-              <a:t>vẫn</a:t>
-            </a:r>
-            <a:r>
-              <a:rPr lang="en-US" dirty="0"/>
-              <a:t> </a:t>
-            </a:r>
-            <a:r>
-              <a:rPr lang="en-US" dirty="0" err="1"/>
-              <a:t>chậm</a:t>
-            </a:r>
-            <a:r>
-              <a:rPr lang="en-US" dirty="0"/>
-              <a:t> </a:t>
-            </a:r>
-            <a:r>
-              <a:rPr lang="en-US" dirty="0" err="1"/>
-              <a:t>hơn</a:t>
-            </a:r>
-            <a:r>
-              <a:rPr lang="en-US" dirty="0"/>
-              <a:t> 8 </a:t>
-            </a:r>
-            <a:r>
-              <a:rPr lang="en-US" dirty="0" err="1"/>
-              <a:t>ngày</a:t>
-            </a:r>
-            <a:r>
-              <a:rPr lang="en-US" dirty="0"/>
-              <a:t> so với </a:t>
-            </a:r>
-            <a:r>
-              <a:rPr lang="en-US" dirty="0" err="1"/>
-              <a:t>dự</a:t>
-            </a:r>
-            <a:r>
-              <a:rPr lang="en-US" dirty="0"/>
-              <a:t> </a:t>
-            </a:r>
-            <a:r>
-              <a:rPr lang="en-US" dirty="0" err="1"/>
-              <a:t>kiến</a:t>
-            </a:r>
-            <a:r>
-              <a:rPr lang="en-US" dirty="0"/>
-              <a:t>. </a:t>
-            </a:r>
-            <a:r>
-              <a:rPr lang="en-US" dirty="0" err="1"/>
-              <a:t>Trong</a:t>
-            </a:r>
-            <a:r>
-              <a:rPr lang="en-US" dirty="0"/>
-              <a:t> </a:t>
-            </a:r>
-            <a:r>
-              <a:rPr lang="en-US" dirty="0" err="1"/>
-              <a:t>giai</a:t>
-            </a:r>
-            <a:r>
-              <a:rPr lang="en-US" dirty="0"/>
-              <a:t> </a:t>
-            </a:r>
-            <a:r>
-              <a:rPr lang="en-US" dirty="0" err="1"/>
-              <a:t>đoạn</a:t>
-            </a:r>
-            <a:r>
-              <a:rPr lang="en-US" dirty="0"/>
-              <a:t> </a:t>
-            </a:r>
-            <a:r>
-              <a:rPr lang="en-US" dirty="0" err="1"/>
-              <a:t>đặt</a:t>
-            </a:r>
-            <a:r>
-              <a:rPr lang="en-US" dirty="0"/>
-              <a:t> </a:t>
-            </a:r>
-            <a:r>
-              <a:rPr lang="en-US" dirty="0" err="1"/>
-              <a:t>mạch</a:t>
-            </a:r>
-            <a:r>
-              <a:rPr lang="en-US" dirty="0"/>
-              <a:t> không thể </a:t>
-            </a:r>
-            <a:r>
-              <a:rPr lang="en-US" dirty="0" err="1"/>
-              <a:t>rút</a:t>
-            </a:r>
-            <a:r>
-              <a:rPr lang="en-US" dirty="0"/>
-              <a:t> </a:t>
-            </a:r>
-            <a:r>
-              <a:rPr lang="en-US" dirty="0" err="1"/>
-              <a:t>ngắn</a:t>
-            </a:r>
-            <a:r>
-              <a:rPr lang="en-US" dirty="0"/>
-              <a:t> thêm </a:t>
-            </a:r>
-            <a:r>
-              <a:rPr lang="en-US" dirty="0" err="1"/>
-              <a:t>thời</a:t>
-            </a:r>
-            <a:r>
-              <a:rPr lang="en-US" dirty="0"/>
-              <a:t> </a:t>
-            </a:r>
-            <a:r>
-              <a:rPr lang="en-US" dirty="0" err="1"/>
-              <a:t>gian</a:t>
-            </a:r>
-            <a:r>
-              <a:rPr lang="en-US" dirty="0"/>
-              <a:t>. Vì thế </a:t>
-            </a:r>
-            <a:r>
-              <a:rPr lang="en-US" dirty="0" err="1"/>
-              <a:t>thời</a:t>
-            </a:r>
-            <a:r>
-              <a:rPr lang="en-US" dirty="0"/>
-              <a:t> </a:t>
-            </a:r>
-            <a:r>
-              <a:rPr lang="en-US" dirty="0" err="1"/>
-              <a:t>gian</a:t>
-            </a:r>
-            <a:r>
-              <a:rPr lang="en-US" dirty="0"/>
-              <a:t> </a:t>
-            </a:r>
-            <a:r>
-              <a:rPr lang="en-US" dirty="0" err="1"/>
-              <a:t>dự</a:t>
-            </a:r>
-            <a:r>
-              <a:rPr lang="en-US" dirty="0"/>
-              <a:t> </a:t>
-            </a:r>
-            <a:r>
-              <a:rPr lang="en-US" dirty="0" err="1"/>
-              <a:t>kiến</a:t>
-            </a:r>
-            <a:r>
-              <a:rPr lang="en-US" dirty="0"/>
-              <a:t> </a:t>
-            </a:r>
-            <a:r>
-              <a:rPr lang="en-US" dirty="0" err="1"/>
-              <a:t>sẽ</a:t>
-            </a:r>
-            <a:r>
-              <a:rPr lang="en-US" dirty="0"/>
-              <a:t> được update </a:t>
-            </a:r>
-            <a:r>
-              <a:rPr lang="en-US" dirty="0" err="1"/>
-              <a:t>trong</a:t>
-            </a:r>
-            <a:r>
-              <a:rPr lang="en-US" dirty="0"/>
-              <a:t> </a:t>
-            </a:r>
-            <a:r>
-              <a:rPr lang="en-US" dirty="0" err="1"/>
-              <a:t>bảng</a:t>
-            </a:r>
-            <a:r>
-              <a:rPr lang="en-US" dirty="0"/>
-              <a:t> timeline </a:t>
-            </a:r>
-            <a:r>
-              <a:rPr lang="en-US" dirty="0" err="1"/>
-              <a:t>phía</a:t>
-            </a:r>
-            <a:r>
-              <a:rPr lang="en-US" dirty="0"/>
-              <a:t> </a:t>
-            </a:r>
-            <a:r>
-              <a:rPr lang="en-US" dirty="0" err="1"/>
-              <a:t>dưới</a:t>
-            </a:r>
-            <a:r>
-              <a:rPr lang="en-US" dirty="0"/>
-              <a:t>.</a:t>
-            </a:r>
-          </a:p>
-          <a:p>
-            <a:r>
-              <a:rPr lang="en-US" dirty="0" err="1"/>
-              <a:t>Nội</a:t>
-            </a:r>
-            <a:r>
-              <a:rPr lang="en-US" dirty="0"/>
-              <a:t> dung </a:t>
-            </a:r>
-            <a:r>
-              <a:rPr lang="en-US" dirty="0" err="1"/>
-              <a:t>dự</a:t>
-            </a:r>
-            <a:r>
-              <a:rPr lang="en-US" dirty="0"/>
-              <a:t> </a:t>
-            </a:r>
-            <a:r>
-              <a:rPr lang="en-US" dirty="0" err="1"/>
-              <a:t>án</a:t>
-            </a:r>
-            <a:r>
-              <a:rPr lang="en-US" dirty="0"/>
-              <a:t>:</a:t>
-            </a:r>
-          </a:p>
-          <a:p>
-            <a:pPr lvl="1"/>
-            <a:r>
-              <a:rPr lang="en-US" dirty="0" err="1"/>
-              <a:t>Còn</a:t>
-            </a:r>
-            <a:r>
-              <a:rPr lang="en-US" dirty="0"/>
-              <a:t> một </a:t>
-            </a:r>
-            <a:r>
-              <a:rPr lang="en-US" dirty="0" err="1"/>
-              <a:t>số</a:t>
-            </a:r>
-            <a:r>
-              <a:rPr lang="en-US" dirty="0"/>
-              <a:t> </a:t>
-            </a:r>
-            <a:r>
-              <a:rPr lang="en-US" dirty="0" err="1"/>
-              <a:t>vấn</a:t>
-            </a:r>
-            <a:r>
-              <a:rPr lang="en-US" dirty="0"/>
-              <a:t> đề cần </a:t>
-            </a:r>
-            <a:r>
-              <a:rPr lang="en-US" dirty="0" err="1"/>
-              <a:t>thống</a:t>
-            </a:r>
-            <a:r>
-              <a:rPr lang="en-US" dirty="0"/>
-              <a:t> </a:t>
-            </a:r>
-            <a:r>
-              <a:rPr lang="en-US" dirty="0" err="1"/>
-              <a:t>nhất</a:t>
-            </a:r>
-            <a:r>
-              <a:rPr lang="en-US" dirty="0"/>
-              <a:t> </a:t>
-            </a:r>
-            <a:r>
-              <a:rPr lang="en-US" dirty="0" err="1"/>
-              <a:t>trước</a:t>
-            </a:r>
-            <a:r>
-              <a:rPr lang="en-US" dirty="0"/>
-              <a:t> khi </a:t>
-            </a:r>
-            <a:r>
-              <a:rPr lang="en-US" dirty="0" err="1"/>
-              <a:t>gửi</a:t>
-            </a:r>
-            <a:r>
-              <a:rPr lang="en-US" dirty="0"/>
-              <a:t> </a:t>
-            </a:r>
-            <a:r>
-              <a:rPr lang="en-US" dirty="0" err="1"/>
-              <a:t>bản</a:t>
-            </a:r>
-            <a:r>
-              <a:rPr lang="en-US" dirty="0"/>
-              <a:t> </a:t>
-            </a:r>
-            <a:r>
-              <a:rPr lang="en-US" dirty="0" err="1"/>
-              <a:t>vẽ</a:t>
-            </a:r>
-            <a:r>
-              <a:rPr lang="en-US" dirty="0"/>
-              <a:t> </a:t>
-            </a:r>
-            <a:r>
-              <a:rPr lang="en-US" dirty="0" err="1"/>
-              <a:t>gia</a:t>
-            </a:r>
-            <a:r>
-              <a:rPr lang="en-US" dirty="0"/>
-              <a:t> </a:t>
-            </a:r>
-            <a:r>
-              <a:rPr lang="en-US" dirty="0" err="1"/>
-              <a:t>công</a:t>
-            </a:r>
-            <a:r>
-              <a:rPr lang="en-US" dirty="0"/>
-              <a:t> </a:t>
-            </a:r>
-            <a:r>
-              <a:rPr lang="en-US" dirty="0" err="1"/>
-              <a:t>cơ</a:t>
-            </a:r>
-            <a:r>
-              <a:rPr lang="en-US" dirty="0"/>
-              <a:t> </a:t>
-            </a:r>
-            <a:r>
-              <a:rPr lang="en-US" dirty="0" err="1"/>
-              <a:t>khí</a:t>
-            </a:r>
-            <a:r>
-              <a:rPr lang="en-US" dirty="0"/>
-              <a:t>. </a:t>
-            </a:r>
-            <a:r>
-              <a:rPr lang="en-US" dirty="0" err="1"/>
-              <a:t>Cụ</a:t>
-            </a:r>
-            <a:r>
-              <a:rPr lang="en-US" dirty="0"/>
-              <a:t> thể:</a:t>
-            </a:r>
-          </a:p>
-          <a:p>
-            <a:pPr lvl="2"/>
-            <a:r>
-              <a:rPr lang="en-US" dirty="0"/>
-              <a:t>Cần </a:t>
-            </a:r>
-            <a:r>
-              <a:rPr lang="en-US" dirty="0" err="1"/>
-              <a:t>trao</a:t>
-            </a:r>
-            <a:r>
-              <a:rPr lang="en-US" dirty="0"/>
-              <a:t> đổi </a:t>
-            </a:r>
-            <a:r>
-              <a:rPr lang="en-US" dirty="0" err="1"/>
-              <a:t>và</a:t>
-            </a:r>
-            <a:r>
-              <a:rPr lang="en-US" dirty="0"/>
-              <a:t> </a:t>
-            </a:r>
-            <a:r>
-              <a:rPr lang="en-US" dirty="0" err="1"/>
-              <a:t>chốt</a:t>
-            </a:r>
-            <a:r>
-              <a:rPr lang="en-US" dirty="0"/>
-              <a:t> một </a:t>
-            </a:r>
-            <a:r>
-              <a:rPr lang="en-US" dirty="0" err="1"/>
-              <a:t>số</a:t>
-            </a:r>
-            <a:r>
-              <a:rPr lang="en-US" dirty="0"/>
-              <a:t> </a:t>
-            </a:r>
-            <a:r>
-              <a:rPr lang="en-US" dirty="0" err="1"/>
-              <a:t>phương</a:t>
-            </a:r>
-            <a:r>
-              <a:rPr lang="en-US" dirty="0"/>
-              <a:t> </a:t>
-            </a:r>
-            <a:r>
-              <a:rPr lang="en-US" dirty="0" err="1"/>
-              <a:t>án</a:t>
-            </a:r>
-            <a:r>
-              <a:rPr lang="en-US" dirty="0"/>
-              <a:t> </a:t>
-            </a:r>
-            <a:r>
-              <a:rPr lang="en-US" dirty="0" err="1"/>
-              <a:t>thiết</a:t>
-            </a:r>
-            <a:r>
-              <a:rPr lang="en-US" dirty="0"/>
-              <a:t> </a:t>
-            </a:r>
-            <a:r>
-              <a:rPr lang="en-US" dirty="0" err="1"/>
-              <a:t>kế</a:t>
-            </a:r>
-            <a:r>
-              <a:rPr lang="en-US" dirty="0"/>
-              <a:t> chi </a:t>
-            </a:r>
-            <a:r>
-              <a:rPr lang="en-US" dirty="0" err="1"/>
-              <a:t>tiết</a:t>
-            </a:r>
-            <a:r>
-              <a:rPr lang="en-US" dirty="0"/>
-              <a:t> </a:t>
-            </a:r>
-            <a:r>
-              <a:rPr lang="en-US" dirty="0" err="1"/>
-              <a:t>phía</a:t>
-            </a:r>
-            <a:r>
-              <a:rPr lang="en-US" dirty="0"/>
-              <a:t> </a:t>
-            </a:r>
-            <a:r>
-              <a:rPr lang="en-US" dirty="0" err="1"/>
-              <a:t>trong</a:t>
-            </a:r>
-            <a:r>
-              <a:rPr lang="en-US" dirty="0"/>
-              <a:t> </a:t>
-            </a:r>
-            <a:r>
-              <a:rPr lang="en-US" dirty="0" err="1"/>
-              <a:t>bản</a:t>
-            </a:r>
-            <a:r>
-              <a:rPr lang="en-US" dirty="0"/>
-              <a:t> </a:t>
-            </a:r>
-            <a:r>
-              <a:rPr lang="en-US" dirty="0" err="1"/>
-              <a:t>vẽ</a:t>
-            </a:r>
-            <a:r>
-              <a:rPr lang="en-US" dirty="0"/>
-              <a:t> </a:t>
-            </a:r>
-            <a:r>
-              <a:rPr lang="en-US" dirty="0" err="1"/>
-              <a:t>cơ</a:t>
-            </a:r>
-            <a:r>
-              <a:rPr lang="en-US" dirty="0"/>
-              <a:t> </a:t>
-            </a:r>
-            <a:r>
-              <a:rPr lang="en-US" dirty="0" err="1"/>
-              <a:t>khí</a:t>
-            </a:r>
-            <a:r>
-              <a:rPr lang="en-US" dirty="0"/>
-              <a:t>.</a:t>
-            </a:r>
-          </a:p>
-          <a:p>
-            <a:pPr lvl="2"/>
-            <a:r>
-              <a:rPr lang="en-US" dirty="0" err="1"/>
-              <a:t>Xác</a:t>
-            </a:r>
-            <a:r>
-              <a:rPr lang="en-US" dirty="0"/>
-              <a:t> </a:t>
-            </a:r>
-            <a:r>
-              <a:rPr lang="en-US" dirty="0" err="1"/>
-              <a:t>nhận</a:t>
-            </a:r>
-            <a:r>
-              <a:rPr lang="en-US" dirty="0"/>
-              <a:t> </a:t>
-            </a:r>
-            <a:r>
-              <a:rPr lang="en-US" dirty="0" err="1"/>
-              <a:t>thông</a:t>
-            </a:r>
-            <a:r>
-              <a:rPr lang="en-US" dirty="0"/>
-              <a:t> </a:t>
-            </a:r>
-            <a:r>
-              <a:rPr lang="en-US" dirty="0" err="1"/>
-              <a:t>số</a:t>
-            </a:r>
-            <a:r>
-              <a:rPr lang="en-US" dirty="0"/>
-              <a:t> </a:t>
-            </a:r>
-            <a:r>
-              <a:rPr lang="en-US" dirty="0" err="1"/>
-              <a:t>trước</a:t>
-            </a:r>
-            <a:r>
-              <a:rPr lang="en-US" dirty="0"/>
-              <a:t> khi </a:t>
-            </a:r>
-            <a:r>
-              <a:rPr lang="en-US" dirty="0" err="1"/>
-              <a:t>gửi</a:t>
-            </a:r>
-            <a:r>
-              <a:rPr lang="en-US" dirty="0"/>
-              <a:t> </a:t>
-            </a:r>
-            <a:r>
-              <a:rPr lang="en-US" dirty="0" err="1"/>
-              <a:t>thông</a:t>
-            </a:r>
-            <a:r>
-              <a:rPr lang="en-US" dirty="0"/>
-              <a:t> tin </a:t>
-            </a:r>
-            <a:r>
-              <a:rPr lang="en-US" dirty="0" err="1"/>
-              <a:t>bản</a:t>
-            </a:r>
-            <a:r>
-              <a:rPr lang="en-US" dirty="0"/>
-              <a:t> </a:t>
-            </a:r>
-            <a:r>
-              <a:rPr lang="en-US" dirty="0" err="1"/>
-              <a:t>thiết</a:t>
-            </a:r>
-            <a:r>
-              <a:rPr lang="en-US" dirty="0"/>
-              <a:t> </a:t>
-            </a:r>
-            <a:r>
-              <a:rPr lang="en-US" dirty="0" err="1"/>
-              <a:t>kế</a:t>
-            </a:r>
-            <a:r>
-              <a:rPr lang="en-US" dirty="0"/>
-              <a:t> </a:t>
-            </a:r>
-            <a:r>
-              <a:rPr lang="en-US" dirty="0" err="1"/>
-              <a:t>cho</a:t>
-            </a:r>
-            <a:r>
-              <a:rPr lang="en-US" dirty="0"/>
-              <a:t> </a:t>
-            </a:r>
-            <a:r>
-              <a:rPr lang="en-US" dirty="0" err="1"/>
-              <a:t>sản</a:t>
-            </a:r>
-            <a:r>
-              <a:rPr lang="en-US" dirty="0"/>
-              <a:t> </a:t>
-            </a:r>
-            <a:r>
-              <a:rPr lang="en-US" dirty="0" err="1"/>
-              <a:t>phẩm</a:t>
-            </a:r>
-            <a:r>
-              <a:rPr lang="en-US" dirty="0"/>
-              <a:t> demo </a:t>
-            </a:r>
-            <a:r>
-              <a:rPr lang="en-US" dirty="0" err="1"/>
-              <a:t>lần</a:t>
-            </a:r>
-            <a:r>
-              <a:rPr lang="en-US" dirty="0"/>
-              <a:t> 1.</a:t>
-            </a:r>
+            <a:endParaRPr lang="en-US" dirty="0"/>
           </a:p>
         </p:txBody>
       </p:sp>
@@ -6502,7 +5186,7 @@
           <p:cNvPr id="4" name="Slide Number Placeholder 3">
             <a:extLst>
               <a:ext uri="{FF2B5EF4-FFF2-40B4-BE49-F238E27FC236}">
-                <a16:creationId xmlns:a16="http://schemas.microsoft.com/office/drawing/2014/main" id="{D401ABA9-DC22-40C8-A5FB-6CCDC54DD49F}"/>
+                <a16:creationId xmlns:a16="http://schemas.microsoft.com/office/drawing/2014/main" id="{9A0B67B7-D960-4CFF-A8F9-131355CCDB6C}"/>
               </a:ext>
             </a:extLst>
           </p:cNvPr>
@@ -6526,10 +5210,197 @@
           </a:p>
         </p:txBody>
       </p:sp>
+      <p:sp>
+        <p:nvSpPr>
+          <p:cNvPr id="22" name="TextBox 21">
+            <a:extLst>
+              <a:ext uri="{FF2B5EF4-FFF2-40B4-BE49-F238E27FC236}">
+                <a16:creationId xmlns:a16="http://schemas.microsoft.com/office/drawing/2014/main" id="{A4B5834A-EDBD-490C-A78A-3D9956278577}"/>
+              </a:ext>
+            </a:extLst>
+          </p:cNvPr>
+          <p:cNvSpPr txBox="1"/>
+          <p:nvPr/>
+        </p:nvSpPr>
+        <p:spPr>
+          <a:xfrm>
+            <a:off x="2759979" y="6234507"/>
+            <a:ext cx="6456726" cy="369332"/>
+          </a:xfrm>
+          <a:prstGeom prst="rect">
+            <a:avLst/>
+          </a:prstGeom>
+          <a:noFill/>
+        </p:spPr>
+        <p:txBody>
+          <a:bodyPr wrap="square" rtlCol="0">
+            <a:spAutoFit/>
+          </a:bodyPr>
+          <a:lstStyle/>
+          <a:p>
+            <a:r>
+              <a:rPr lang="en-US" i="1" dirty="0" err="1"/>
+              <a:t>Hình</a:t>
+            </a:r>
+            <a:r>
+              <a:rPr lang="en-US" i="1" dirty="0"/>
+              <a:t> 2: </a:t>
+            </a:r>
+            <a:r>
+              <a:rPr lang="en-US" i="1" dirty="0" err="1"/>
+              <a:t>Hình</a:t>
+            </a:r>
+            <a:r>
+              <a:rPr lang="en-US" i="1" dirty="0"/>
+              <a:t> </a:t>
+            </a:r>
+            <a:r>
+              <a:rPr lang="en-US" i="1" dirty="0" err="1"/>
+              <a:t>ảnh</a:t>
+            </a:r>
+            <a:r>
+              <a:rPr lang="en-US" i="1" dirty="0"/>
+              <a:t> </a:t>
+            </a:r>
+            <a:r>
+              <a:rPr lang="en-US" i="1" dirty="0" err="1"/>
+              <a:t>miêu</a:t>
+            </a:r>
+            <a:r>
+              <a:rPr lang="en-US" i="1" dirty="0"/>
+              <a:t> </a:t>
+            </a:r>
+            <a:r>
+              <a:rPr lang="en-US" i="1" dirty="0" err="1"/>
+              <a:t>tả</a:t>
+            </a:r>
+            <a:r>
+              <a:rPr lang="en-US" i="1" dirty="0"/>
+              <a:t> </a:t>
+            </a:r>
+            <a:r>
+              <a:rPr lang="en-US" i="1" dirty="0" err="1"/>
+              <a:t>bản</a:t>
+            </a:r>
+            <a:r>
+              <a:rPr lang="en-US" i="1" dirty="0"/>
+              <a:t> </a:t>
+            </a:r>
+            <a:r>
+              <a:rPr lang="en-US" i="1" dirty="0" err="1"/>
+              <a:t>vẽ</a:t>
+            </a:r>
+            <a:r>
+              <a:rPr lang="en-US" i="1" dirty="0"/>
+              <a:t> </a:t>
+            </a:r>
+            <a:r>
+              <a:rPr lang="en-US" i="1" dirty="0" err="1"/>
+              <a:t>cơ</a:t>
+            </a:r>
+            <a:r>
+              <a:rPr lang="en-US" i="1" dirty="0"/>
+              <a:t> </a:t>
+            </a:r>
+            <a:r>
+              <a:rPr lang="en-US" i="1" dirty="0" err="1"/>
+              <a:t>khí</a:t>
+            </a:r>
+            <a:r>
+              <a:rPr lang="en-US" i="1" dirty="0"/>
+              <a:t> một </a:t>
+            </a:r>
+            <a:r>
+              <a:rPr lang="en-US" i="1" dirty="0" err="1"/>
+              <a:t>số</a:t>
+            </a:r>
+            <a:r>
+              <a:rPr lang="en-US" i="1" dirty="0"/>
+              <a:t> phần của </a:t>
+            </a:r>
+            <a:r>
+              <a:rPr lang="en-US" i="1" dirty="0" err="1"/>
+              <a:t>sản</a:t>
+            </a:r>
+            <a:r>
+              <a:rPr lang="en-US" i="1" dirty="0"/>
+              <a:t> </a:t>
+            </a:r>
+            <a:r>
+              <a:rPr lang="en-US" i="1" dirty="0" err="1"/>
+              <a:t>phẩm</a:t>
+            </a:r>
+            <a:r>
+              <a:rPr lang="en-US" dirty="0"/>
+              <a:t>.</a:t>
+            </a:r>
+          </a:p>
+        </p:txBody>
+      </p:sp>
+      <p:pic>
+        <p:nvPicPr>
+          <p:cNvPr id="6" name="Picture 5">
+            <a:extLst>
+              <a:ext uri="{FF2B5EF4-FFF2-40B4-BE49-F238E27FC236}">
+                <a16:creationId xmlns:a16="http://schemas.microsoft.com/office/drawing/2014/main" id="{9D922CE0-ED51-477B-B708-A67DB59B8CFA}"/>
+              </a:ext>
+            </a:extLst>
+          </p:cNvPr>
+          <p:cNvPicPr>
+            <a:picLocks noChangeAspect="1"/>
+          </p:cNvPicPr>
+          <p:nvPr/>
+        </p:nvPicPr>
+        <p:blipFill>
+          <a:blip r:embed="rId2"/>
+          <a:stretch>
+            <a:fillRect/>
+          </a:stretch>
+        </p:blipFill>
+        <p:spPr>
+          <a:xfrm>
+            <a:off x="838200" y="1984509"/>
+            <a:ext cx="5890723" cy="3808657"/>
+          </a:xfrm>
+          <a:prstGeom prst="rect">
+            <a:avLst/>
+          </a:prstGeom>
+        </p:spPr>
+      </p:pic>
+      <p:pic>
+        <p:nvPicPr>
+          <p:cNvPr id="8" name="Picture 7">
+            <a:extLst>
+              <a:ext uri="{FF2B5EF4-FFF2-40B4-BE49-F238E27FC236}">
+                <a16:creationId xmlns:a16="http://schemas.microsoft.com/office/drawing/2014/main" id="{36674CDF-265B-4C9F-8D1E-3F2B261FF970}"/>
+              </a:ext>
+            </a:extLst>
+          </p:cNvPr>
+          <p:cNvPicPr>
+            <a:picLocks noChangeAspect="1"/>
+          </p:cNvPicPr>
+          <p:nvPr/>
+        </p:nvPicPr>
+        <p:blipFill>
+          <a:blip r:embed="rId3"/>
+          <a:stretch>
+            <a:fillRect/>
+          </a:stretch>
+        </p:blipFill>
+        <p:spPr>
+          <a:xfrm>
+            <a:off x="6728923" y="2181138"/>
+            <a:ext cx="5007594" cy="3533026"/>
+          </a:xfrm>
+          <a:prstGeom prst="rect">
+            <a:avLst/>
+          </a:prstGeom>
+        </p:spPr>
+      </p:pic>
     </p:spTree>
     <p:extLst>
       <p:ext uri="{BB962C8B-B14F-4D97-AF65-F5344CB8AC3E}">
-        <p14:creationId xmlns:p14="http://schemas.microsoft.com/office/powerpoint/2010/main" val="2239553262"/>
+        <p14:creationId xmlns:p14="http://schemas.microsoft.com/office/powerpoint/2010/main" val="2751479245"/>
       </p:ext>
     </p:extLst>
   </p:cSld>
@@ -6584,6 +5455,886 @@
           <a:p>
             <a:r>
               <a:rPr lang="en-US" b="1" dirty="0" err="1"/>
+              <a:t>Vấn</a:t>
+            </a:r>
+            <a:r>
+              <a:rPr lang="en-US" b="1" dirty="0"/>
+              <a:t> đề </a:t>
+            </a:r>
+            <a:r>
+              <a:rPr lang="en-US" b="1" dirty="0" err="1"/>
+              <a:t>còn</a:t>
+            </a:r>
+            <a:r>
+              <a:rPr lang="en-US" b="1" dirty="0"/>
+              <a:t> </a:t>
+            </a:r>
+            <a:r>
+              <a:rPr lang="en-US" b="1" dirty="0" err="1"/>
+              <a:t>gặp</a:t>
+            </a:r>
+            <a:r>
+              <a:rPr lang="en-US" b="1" dirty="0"/>
+              <a:t> phải.</a:t>
+            </a:r>
+          </a:p>
+        </p:txBody>
+      </p:sp>
+      <p:sp>
+        <p:nvSpPr>
+          <p:cNvPr id="3" name="Content Placeholder 2">
+            <a:extLst>
+              <a:ext uri="{FF2B5EF4-FFF2-40B4-BE49-F238E27FC236}">
+                <a16:creationId xmlns:a16="http://schemas.microsoft.com/office/drawing/2014/main" id="{27646CDC-FAF8-4288-8291-4771C175B291}"/>
+              </a:ext>
+            </a:extLst>
+          </p:cNvPr>
+          <p:cNvSpPr>
+            <a:spLocks noGrp="1"/>
+          </p:cNvSpPr>
+          <p:nvPr>
+            <p:ph idx="1"/>
+          </p:nvPr>
+        </p:nvSpPr>
+        <p:spPr>
+          <a:xfrm>
+            <a:off x="838200" y="1350628"/>
+            <a:ext cx="10515600" cy="4826335"/>
+          </a:xfrm>
+        </p:spPr>
+        <p:txBody>
+          <a:bodyPr>
+            <a:normAutofit/>
+          </a:bodyPr>
+          <a:lstStyle/>
+          <a:p>
+            <a:r>
+              <a:rPr lang="en-US" dirty="0" err="1"/>
+              <a:t>Tiến</a:t>
+            </a:r>
+            <a:r>
+              <a:rPr lang="en-US" dirty="0"/>
+              <a:t> </a:t>
+            </a:r>
+            <a:r>
+              <a:rPr lang="en-US" dirty="0" err="1"/>
+              <a:t>độ</a:t>
+            </a:r>
+            <a:r>
+              <a:rPr lang="en-US" dirty="0"/>
+              <a:t> </a:t>
+            </a:r>
+            <a:r>
+              <a:rPr lang="en-US" dirty="0" err="1"/>
+              <a:t>dự</a:t>
+            </a:r>
+            <a:r>
+              <a:rPr lang="en-US" dirty="0"/>
+              <a:t> </a:t>
+            </a:r>
+            <a:r>
+              <a:rPr lang="en-US" dirty="0" err="1"/>
+              <a:t>án</a:t>
+            </a:r>
+            <a:r>
+              <a:rPr lang="en-US" dirty="0"/>
+              <a:t>:</a:t>
+            </a:r>
+          </a:p>
+          <a:p>
+            <a:pPr marL="457200" lvl="1" indent="0">
+              <a:buNone/>
+            </a:pPr>
+            <a:r>
+              <a:rPr lang="en-US" dirty="0" err="1"/>
+              <a:t>Hiện</a:t>
+            </a:r>
+            <a:r>
+              <a:rPr lang="en-US" dirty="0"/>
+              <a:t> </a:t>
+            </a:r>
+            <a:r>
+              <a:rPr lang="en-US" dirty="0" err="1"/>
+              <a:t>tại</a:t>
+            </a:r>
+            <a:r>
+              <a:rPr lang="en-US" dirty="0"/>
+              <a:t> </a:t>
+            </a:r>
+            <a:r>
+              <a:rPr lang="en-US" dirty="0" err="1"/>
+              <a:t>tiến</a:t>
+            </a:r>
+            <a:r>
+              <a:rPr lang="en-US" dirty="0"/>
+              <a:t> </a:t>
+            </a:r>
+            <a:r>
+              <a:rPr lang="en-US" dirty="0" err="1"/>
+              <a:t>độ</a:t>
+            </a:r>
+            <a:r>
+              <a:rPr lang="en-US" dirty="0"/>
+              <a:t> </a:t>
+            </a:r>
+            <a:r>
+              <a:rPr lang="en-US" dirty="0" err="1"/>
+              <a:t>dự</a:t>
+            </a:r>
+            <a:r>
+              <a:rPr lang="en-US" dirty="0"/>
+              <a:t> </a:t>
+            </a:r>
+            <a:r>
+              <a:rPr lang="en-US" dirty="0" err="1"/>
+              <a:t>án</a:t>
+            </a:r>
+            <a:r>
+              <a:rPr lang="en-US" dirty="0"/>
+              <a:t> </a:t>
+            </a:r>
+            <a:r>
+              <a:rPr lang="en-US" dirty="0" err="1"/>
+              <a:t>chậm</a:t>
+            </a:r>
+            <a:r>
+              <a:rPr lang="en-US" dirty="0"/>
+              <a:t> </a:t>
+            </a:r>
+            <a:r>
+              <a:rPr lang="en-US" dirty="0" err="1"/>
+              <a:t>hơn</a:t>
+            </a:r>
+            <a:r>
+              <a:rPr lang="en-US" dirty="0"/>
+              <a:t> so với </a:t>
+            </a:r>
+            <a:r>
+              <a:rPr lang="en-US" dirty="0" err="1"/>
+              <a:t>kế</a:t>
+            </a:r>
+            <a:r>
+              <a:rPr lang="en-US" dirty="0"/>
+              <a:t> </a:t>
+            </a:r>
+            <a:r>
+              <a:rPr lang="en-US" dirty="0" err="1"/>
+              <a:t>hoạch</a:t>
+            </a:r>
+            <a:r>
+              <a:rPr lang="en-US" dirty="0"/>
+              <a:t> </a:t>
+            </a:r>
+            <a:r>
+              <a:rPr lang="en-US" dirty="0" err="1"/>
+              <a:t>đặt</a:t>
+            </a:r>
+            <a:r>
+              <a:rPr lang="en-US" dirty="0"/>
+              <a:t> </a:t>
+            </a:r>
+            <a:r>
+              <a:rPr lang="en-US" dirty="0" err="1"/>
+              <a:t>ra</a:t>
+            </a:r>
+            <a:r>
+              <a:rPr lang="en-US" dirty="0"/>
+              <a:t>, </a:t>
+            </a:r>
+            <a:r>
+              <a:rPr lang="en-US" dirty="0" err="1"/>
+              <a:t>cụ</a:t>
+            </a:r>
+            <a:r>
+              <a:rPr lang="en-US" dirty="0"/>
+              <a:t> thể:</a:t>
+            </a:r>
+          </a:p>
+          <a:p>
+            <a:pPr marL="914400" lvl="2" indent="0">
+              <a:buNone/>
+            </a:pPr>
+            <a:r>
+              <a:rPr lang="en-US" dirty="0" err="1"/>
+              <a:t>Kế</a:t>
+            </a:r>
+            <a:r>
+              <a:rPr lang="en-US" dirty="0"/>
+              <a:t> </a:t>
+            </a:r>
+            <a:r>
+              <a:rPr lang="en-US" dirty="0" err="1"/>
+              <a:t>hoạch</a:t>
+            </a:r>
+            <a:r>
+              <a:rPr lang="en-US" dirty="0"/>
+              <a:t> </a:t>
+            </a:r>
+            <a:r>
+              <a:rPr lang="en-US" dirty="0" err="1"/>
+              <a:t>vẫn</a:t>
+            </a:r>
+            <a:r>
+              <a:rPr lang="en-US" dirty="0"/>
+              <a:t> </a:t>
+            </a:r>
+            <a:r>
+              <a:rPr lang="en-US" dirty="0" err="1"/>
+              <a:t>chậm</a:t>
+            </a:r>
+            <a:r>
+              <a:rPr lang="en-US" dirty="0"/>
+              <a:t> </a:t>
+            </a:r>
+            <a:r>
+              <a:rPr lang="en-US" dirty="0" err="1"/>
+              <a:t>hơn</a:t>
+            </a:r>
+            <a:r>
+              <a:rPr lang="en-US" dirty="0"/>
+              <a:t> 8 </a:t>
+            </a:r>
+            <a:r>
+              <a:rPr lang="en-US" dirty="0" err="1"/>
+              <a:t>ngày</a:t>
+            </a:r>
+            <a:r>
+              <a:rPr lang="en-US" dirty="0"/>
+              <a:t> so với </a:t>
+            </a:r>
+            <a:r>
+              <a:rPr lang="en-US" dirty="0" err="1"/>
+              <a:t>dự</a:t>
+            </a:r>
+            <a:r>
+              <a:rPr lang="en-US" dirty="0"/>
+              <a:t> </a:t>
+            </a:r>
+            <a:r>
+              <a:rPr lang="en-US" dirty="0" err="1"/>
+              <a:t>kiến</a:t>
+            </a:r>
+            <a:r>
+              <a:rPr lang="en-US" dirty="0"/>
+              <a:t>. </a:t>
+            </a:r>
+            <a:r>
+              <a:rPr lang="en-US" dirty="0" err="1"/>
+              <a:t>Trong</a:t>
+            </a:r>
+            <a:r>
+              <a:rPr lang="en-US" dirty="0"/>
+              <a:t> </a:t>
+            </a:r>
+            <a:r>
+              <a:rPr lang="en-US" dirty="0" err="1"/>
+              <a:t>giai</a:t>
+            </a:r>
+            <a:r>
+              <a:rPr lang="en-US" dirty="0"/>
+              <a:t> </a:t>
+            </a:r>
+            <a:r>
+              <a:rPr lang="en-US" dirty="0" err="1"/>
+              <a:t>đoạn</a:t>
+            </a:r>
+            <a:r>
+              <a:rPr lang="en-US" dirty="0"/>
+              <a:t> </a:t>
+            </a:r>
+            <a:r>
+              <a:rPr lang="en-US" dirty="0" err="1"/>
+              <a:t>đặt</a:t>
+            </a:r>
+            <a:r>
+              <a:rPr lang="en-US" dirty="0"/>
+              <a:t> </a:t>
+            </a:r>
+            <a:r>
+              <a:rPr lang="en-US" dirty="0" err="1"/>
+              <a:t>mạch</a:t>
+            </a:r>
+            <a:r>
+              <a:rPr lang="en-US" dirty="0"/>
+              <a:t> không thể </a:t>
+            </a:r>
+            <a:r>
+              <a:rPr lang="en-US" dirty="0" err="1"/>
+              <a:t>rút</a:t>
+            </a:r>
+            <a:r>
+              <a:rPr lang="en-US" dirty="0"/>
+              <a:t> </a:t>
+            </a:r>
+            <a:r>
+              <a:rPr lang="en-US" dirty="0" err="1"/>
+              <a:t>ngắn</a:t>
+            </a:r>
+            <a:r>
+              <a:rPr lang="en-US" dirty="0"/>
+              <a:t> thêm </a:t>
+            </a:r>
+            <a:r>
+              <a:rPr lang="en-US" dirty="0" err="1"/>
+              <a:t>thời</a:t>
+            </a:r>
+            <a:r>
+              <a:rPr lang="en-US" dirty="0"/>
+              <a:t> </a:t>
+            </a:r>
+            <a:r>
+              <a:rPr lang="en-US" dirty="0" err="1"/>
+              <a:t>gian</a:t>
+            </a:r>
+            <a:r>
+              <a:rPr lang="en-US" dirty="0"/>
+              <a:t>. Vì thế </a:t>
+            </a:r>
+            <a:r>
+              <a:rPr lang="en-US" dirty="0" err="1"/>
+              <a:t>thời</a:t>
+            </a:r>
+            <a:r>
+              <a:rPr lang="en-US" dirty="0"/>
+              <a:t> </a:t>
+            </a:r>
+            <a:r>
+              <a:rPr lang="en-US" dirty="0" err="1"/>
+              <a:t>gian</a:t>
+            </a:r>
+            <a:r>
+              <a:rPr lang="en-US" dirty="0"/>
+              <a:t> </a:t>
+            </a:r>
+            <a:r>
+              <a:rPr lang="en-US" dirty="0" err="1"/>
+              <a:t>dự</a:t>
+            </a:r>
+            <a:r>
+              <a:rPr lang="en-US" dirty="0"/>
+              <a:t> </a:t>
+            </a:r>
+            <a:r>
+              <a:rPr lang="en-US" dirty="0" err="1"/>
+              <a:t>kiến</a:t>
+            </a:r>
+            <a:r>
+              <a:rPr lang="en-US" dirty="0"/>
+              <a:t> </a:t>
+            </a:r>
+            <a:r>
+              <a:rPr lang="en-US" dirty="0" err="1"/>
+              <a:t>sẽ</a:t>
+            </a:r>
+            <a:r>
+              <a:rPr lang="en-US" dirty="0"/>
+              <a:t> được update </a:t>
+            </a:r>
+            <a:r>
+              <a:rPr lang="en-US" dirty="0" err="1"/>
+              <a:t>trong</a:t>
+            </a:r>
+            <a:r>
+              <a:rPr lang="en-US" dirty="0"/>
+              <a:t> </a:t>
+            </a:r>
+            <a:r>
+              <a:rPr lang="en-US" dirty="0" err="1"/>
+              <a:t>bảng</a:t>
+            </a:r>
+            <a:r>
+              <a:rPr lang="en-US" dirty="0"/>
+              <a:t> timeline </a:t>
+            </a:r>
+            <a:r>
+              <a:rPr lang="en-US" dirty="0" err="1"/>
+              <a:t>phía</a:t>
+            </a:r>
+            <a:r>
+              <a:rPr lang="en-US" dirty="0"/>
+              <a:t> </a:t>
+            </a:r>
+            <a:r>
+              <a:rPr lang="en-US" dirty="0" err="1"/>
+              <a:t>dưới</a:t>
+            </a:r>
+            <a:r>
+              <a:rPr lang="en-US" dirty="0"/>
+              <a:t>.</a:t>
+            </a:r>
+          </a:p>
+          <a:p>
+            <a:r>
+              <a:rPr lang="en-US" dirty="0" err="1"/>
+              <a:t>Nội</a:t>
+            </a:r>
+            <a:r>
+              <a:rPr lang="en-US" dirty="0"/>
+              <a:t> dung </a:t>
+            </a:r>
+            <a:r>
+              <a:rPr lang="en-US" dirty="0" err="1"/>
+              <a:t>dự</a:t>
+            </a:r>
+            <a:r>
+              <a:rPr lang="en-US" dirty="0"/>
+              <a:t> </a:t>
+            </a:r>
+            <a:r>
+              <a:rPr lang="en-US" dirty="0" err="1"/>
+              <a:t>án</a:t>
+            </a:r>
+            <a:r>
+              <a:rPr lang="en-US" dirty="0"/>
+              <a:t>:</a:t>
+            </a:r>
+          </a:p>
+          <a:p>
+            <a:pPr lvl="1"/>
+            <a:r>
+              <a:rPr lang="en-US" dirty="0" err="1"/>
+              <a:t>Còn</a:t>
+            </a:r>
+            <a:r>
+              <a:rPr lang="en-US" dirty="0"/>
+              <a:t> một </a:t>
+            </a:r>
+            <a:r>
+              <a:rPr lang="en-US" dirty="0" err="1"/>
+              <a:t>số</a:t>
+            </a:r>
+            <a:r>
+              <a:rPr lang="en-US" dirty="0"/>
+              <a:t> </a:t>
+            </a:r>
+            <a:r>
+              <a:rPr lang="en-US" dirty="0" err="1"/>
+              <a:t>vấn</a:t>
+            </a:r>
+            <a:r>
+              <a:rPr lang="en-US" dirty="0"/>
+              <a:t> đề cần </a:t>
+            </a:r>
+            <a:r>
+              <a:rPr lang="en-US" dirty="0" err="1"/>
+              <a:t>thống</a:t>
+            </a:r>
+            <a:r>
+              <a:rPr lang="en-US" dirty="0"/>
+              <a:t> </a:t>
+            </a:r>
+            <a:r>
+              <a:rPr lang="en-US" dirty="0" err="1"/>
+              <a:t>nhất</a:t>
+            </a:r>
+            <a:r>
+              <a:rPr lang="en-US" dirty="0"/>
+              <a:t> </a:t>
+            </a:r>
+            <a:r>
+              <a:rPr lang="en-US" dirty="0" err="1"/>
+              <a:t>trước</a:t>
+            </a:r>
+            <a:r>
+              <a:rPr lang="en-US" dirty="0"/>
+              <a:t> khi </a:t>
+            </a:r>
+            <a:r>
+              <a:rPr lang="en-US" dirty="0" err="1"/>
+              <a:t>gửi</a:t>
+            </a:r>
+            <a:r>
+              <a:rPr lang="en-US" dirty="0"/>
+              <a:t> </a:t>
+            </a:r>
+            <a:r>
+              <a:rPr lang="en-US" dirty="0" err="1"/>
+              <a:t>bản</a:t>
+            </a:r>
+            <a:r>
+              <a:rPr lang="en-US" dirty="0"/>
+              <a:t> </a:t>
+            </a:r>
+            <a:r>
+              <a:rPr lang="en-US" dirty="0" err="1"/>
+              <a:t>vẽ</a:t>
+            </a:r>
+            <a:r>
+              <a:rPr lang="en-US" dirty="0"/>
+              <a:t> </a:t>
+            </a:r>
+            <a:r>
+              <a:rPr lang="en-US" dirty="0" err="1"/>
+              <a:t>gia</a:t>
+            </a:r>
+            <a:r>
+              <a:rPr lang="en-US" dirty="0"/>
+              <a:t> </a:t>
+            </a:r>
+            <a:r>
+              <a:rPr lang="en-US" dirty="0" err="1"/>
+              <a:t>công</a:t>
+            </a:r>
+            <a:r>
+              <a:rPr lang="en-US" dirty="0"/>
+              <a:t> </a:t>
+            </a:r>
+            <a:r>
+              <a:rPr lang="en-US" dirty="0" err="1"/>
+              <a:t>cơ</a:t>
+            </a:r>
+            <a:r>
+              <a:rPr lang="en-US" dirty="0"/>
+              <a:t> </a:t>
+            </a:r>
+            <a:r>
+              <a:rPr lang="en-US" dirty="0" err="1"/>
+              <a:t>khí</a:t>
+            </a:r>
+            <a:r>
+              <a:rPr lang="en-US" dirty="0"/>
+              <a:t>. </a:t>
+            </a:r>
+            <a:r>
+              <a:rPr lang="en-US" dirty="0" err="1"/>
+              <a:t>Cụ</a:t>
+            </a:r>
+            <a:r>
+              <a:rPr lang="en-US" dirty="0"/>
+              <a:t> thể:</a:t>
+            </a:r>
+          </a:p>
+          <a:p>
+            <a:pPr lvl="2"/>
+            <a:r>
+              <a:rPr lang="en-US" dirty="0"/>
+              <a:t>Cần </a:t>
+            </a:r>
+            <a:r>
+              <a:rPr lang="en-US" dirty="0" err="1"/>
+              <a:t>trao</a:t>
+            </a:r>
+            <a:r>
+              <a:rPr lang="en-US" dirty="0"/>
+              <a:t> đổi </a:t>
+            </a:r>
+            <a:r>
+              <a:rPr lang="en-US" dirty="0" err="1"/>
+              <a:t>và</a:t>
+            </a:r>
+            <a:r>
+              <a:rPr lang="en-US" dirty="0"/>
+              <a:t> </a:t>
+            </a:r>
+            <a:r>
+              <a:rPr lang="en-US" dirty="0" err="1"/>
+              <a:t>chốt</a:t>
+            </a:r>
+            <a:r>
+              <a:rPr lang="en-US" dirty="0"/>
+              <a:t> một </a:t>
+            </a:r>
+            <a:r>
+              <a:rPr lang="en-US" dirty="0" err="1"/>
+              <a:t>số</a:t>
+            </a:r>
+            <a:r>
+              <a:rPr lang="en-US" dirty="0"/>
+              <a:t> </a:t>
+            </a:r>
+            <a:r>
+              <a:rPr lang="en-US" dirty="0" err="1"/>
+              <a:t>phương</a:t>
+            </a:r>
+            <a:r>
+              <a:rPr lang="en-US" dirty="0"/>
+              <a:t> </a:t>
+            </a:r>
+            <a:r>
+              <a:rPr lang="en-US" dirty="0" err="1"/>
+              <a:t>án</a:t>
+            </a:r>
+            <a:r>
+              <a:rPr lang="en-US" dirty="0"/>
+              <a:t> </a:t>
+            </a:r>
+            <a:r>
+              <a:rPr lang="en-US" dirty="0" err="1"/>
+              <a:t>thiết</a:t>
+            </a:r>
+            <a:r>
+              <a:rPr lang="en-US" dirty="0"/>
+              <a:t> </a:t>
+            </a:r>
+            <a:r>
+              <a:rPr lang="en-US" dirty="0" err="1"/>
+              <a:t>kế</a:t>
+            </a:r>
+            <a:r>
+              <a:rPr lang="en-US" dirty="0"/>
+              <a:t> chi </a:t>
+            </a:r>
+            <a:r>
+              <a:rPr lang="en-US" dirty="0" err="1"/>
+              <a:t>tiết</a:t>
+            </a:r>
+            <a:r>
+              <a:rPr lang="en-US" dirty="0"/>
+              <a:t> </a:t>
+            </a:r>
+            <a:r>
+              <a:rPr lang="en-US" dirty="0" err="1"/>
+              <a:t>phía</a:t>
+            </a:r>
+            <a:r>
+              <a:rPr lang="en-US" dirty="0"/>
+              <a:t> </a:t>
+            </a:r>
+            <a:r>
+              <a:rPr lang="en-US" dirty="0" err="1"/>
+              <a:t>trong</a:t>
+            </a:r>
+            <a:r>
+              <a:rPr lang="en-US" dirty="0"/>
+              <a:t> </a:t>
+            </a:r>
+            <a:r>
+              <a:rPr lang="en-US" dirty="0" err="1"/>
+              <a:t>bản</a:t>
+            </a:r>
+            <a:r>
+              <a:rPr lang="en-US" dirty="0"/>
+              <a:t> </a:t>
+            </a:r>
+            <a:r>
+              <a:rPr lang="en-US" dirty="0" err="1"/>
+              <a:t>vẽ</a:t>
+            </a:r>
+            <a:r>
+              <a:rPr lang="en-US" dirty="0"/>
+              <a:t> </a:t>
+            </a:r>
+            <a:r>
+              <a:rPr lang="en-US" dirty="0" err="1"/>
+              <a:t>cơ</a:t>
+            </a:r>
+            <a:r>
+              <a:rPr lang="en-US" dirty="0"/>
+              <a:t> </a:t>
+            </a:r>
+            <a:r>
+              <a:rPr lang="en-US" dirty="0" err="1"/>
+              <a:t>khí</a:t>
+            </a:r>
+            <a:r>
+              <a:rPr lang="en-US" dirty="0"/>
+              <a:t>.</a:t>
+            </a:r>
+          </a:p>
+          <a:p>
+            <a:pPr lvl="2"/>
+            <a:r>
+              <a:rPr lang="en-US" dirty="0" err="1"/>
+              <a:t>Xác</a:t>
+            </a:r>
+            <a:r>
+              <a:rPr lang="en-US" dirty="0"/>
+              <a:t> </a:t>
+            </a:r>
+            <a:r>
+              <a:rPr lang="en-US" dirty="0" err="1"/>
+              <a:t>nhận</a:t>
+            </a:r>
+            <a:r>
+              <a:rPr lang="en-US" dirty="0"/>
+              <a:t> </a:t>
+            </a:r>
+            <a:r>
+              <a:rPr lang="en-US" dirty="0" err="1"/>
+              <a:t>thông</a:t>
+            </a:r>
+            <a:r>
+              <a:rPr lang="en-US" dirty="0"/>
+              <a:t> </a:t>
+            </a:r>
+            <a:r>
+              <a:rPr lang="en-US" dirty="0" err="1"/>
+              <a:t>số</a:t>
+            </a:r>
+            <a:r>
+              <a:rPr lang="en-US" dirty="0"/>
+              <a:t> </a:t>
+            </a:r>
+            <a:r>
+              <a:rPr lang="en-US" dirty="0" err="1"/>
+              <a:t>trước</a:t>
+            </a:r>
+            <a:r>
+              <a:rPr lang="en-US" dirty="0"/>
+              <a:t> khi </a:t>
+            </a:r>
+            <a:r>
+              <a:rPr lang="en-US" dirty="0" err="1"/>
+              <a:t>gửi</a:t>
+            </a:r>
+            <a:r>
+              <a:rPr lang="en-US" dirty="0"/>
+              <a:t> </a:t>
+            </a:r>
+            <a:r>
+              <a:rPr lang="en-US" dirty="0" err="1"/>
+              <a:t>thông</a:t>
+            </a:r>
+            <a:r>
+              <a:rPr lang="en-US" dirty="0"/>
+              <a:t> tin </a:t>
+            </a:r>
+            <a:r>
+              <a:rPr lang="en-US" dirty="0" err="1"/>
+              <a:t>bản</a:t>
+            </a:r>
+            <a:r>
+              <a:rPr lang="en-US" dirty="0"/>
+              <a:t> </a:t>
+            </a:r>
+            <a:r>
+              <a:rPr lang="en-US" dirty="0" err="1"/>
+              <a:t>thiết</a:t>
+            </a:r>
+            <a:r>
+              <a:rPr lang="en-US" dirty="0"/>
+              <a:t> </a:t>
+            </a:r>
+            <a:r>
+              <a:rPr lang="en-US" dirty="0" err="1"/>
+              <a:t>kế</a:t>
+            </a:r>
+            <a:r>
+              <a:rPr lang="en-US" dirty="0"/>
+              <a:t> </a:t>
+            </a:r>
+            <a:r>
+              <a:rPr lang="en-US" dirty="0" err="1"/>
+              <a:t>cho</a:t>
+            </a:r>
+            <a:r>
+              <a:rPr lang="en-US" dirty="0"/>
+              <a:t> </a:t>
+            </a:r>
+            <a:r>
+              <a:rPr lang="en-US" dirty="0" err="1"/>
+              <a:t>sản</a:t>
+            </a:r>
+            <a:r>
+              <a:rPr lang="en-US" dirty="0"/>
+              <a:t> </a:t>
+            </a:r>
+            <a:r>
+              <a:rPr lang="en-US" dirty="0" err="1"/>
+              <a:t>phẩm</a:t>
+            </a:r>
+            <a:r>
+              <a:rPr lang="en-US" dirty="0"/>
+              <a:t> demo </a:t>
+            </a:r>
+            <a:r>
+              <a:rPr lang="en-US" dirty="0" err="1"/>
+              <a:t>lần</a:t>
+            </a:r>
+            <a:r>
+              <a:rPr lang="en-US" dirty="0"/>
+              <a:t> 1.</a:t>
+            </a:r>
+          </a:p>
+        </p:txBody>
+      </p:sp>
+      <p:sp>
+        <p:nvSpPr>
+          <p:cNvPr id="4" name="Slide Number Placeholder 3">
+            <a:extLst>
+              <a:ext uri="{FF2B5EF4-FFF2-40B4-BE49-F238E27FC236}">
+                <a16:creationId xmlns:a16="http://schemas.microsoft.com/office/drawing/2014/main" id="{D401ABA9-DC22-40C8-A5FB-6CCDC54DD49F}"/>
+              </a:ext>
+            </a:extLst>
+          </p:cNvPr>
+          <p:cNvSpPr>
+            <a:spLocks noGrp="1"/>
+          </p:cNvSpPr>
+          <p:nvPr>
+            <p:ph type="sldNum" sz="quarter" idx="12"/>
+          </p:nvPr>
+        </p:nvSpPr>
+        <p:spPr/>
+        <p:txBody>
+          <a:bodyPr/>
+          <a:lstStyle/>
+          <a:p>
+            <a:fld id="{35D51119-8157-4B7F-903F-73E30443DBF0}" type="slidenum">
+              <a:rPr lang="en-US" smtClean="0"/>
+              <a:t>6</a:t>
+            </a:fld>
+            <a:endParaRPr lang="en-US"/>
+          </a:p>
+        </p:txBody>
+      </p:sp>
+    </p:spTree>
+    <p:extLst>
+      <p:ext uri="{BB962C8B-B14F-4D97-AF65-F5344CB8AC3E}">
+        <p14:creationId xmlns:p14="http://schemas.microsoft.com/office/powerpoint/2010/main" val="2239553262"/>
+      </p:ext>
+    </p:extLst>
+  </p:cSld>
+  <p:clrMapOvr>
+    <a:masterClrMapping/>
+  </p:clrMapOvr>
+</p:sld>
+</file>
+
+<file path=ppt/slides/slide7.xml><?xml version="1.0" encoding="utf-8"?>
+<p:sld xmlns:a="http://schemas.openxmlformats.org/drawingml/2006/main" xmlns:r="http://schemas.openxmlformats.org/officeDocument/2006/relationships" xmlns:p="http://schemas.openxmlformats.org/presentationml/2006/main">
+  <p:cSld>
+    <p:spTree>
+      <p:nvGrpSpPr>
+        <p:cNvPr id="1" name=""/>
+        <p:cNvGrpSpPr/>
+        <p:nvPr/>
+      </p:nvGrpSpPr>
+      <p:grpSpPr>
+        <a:xfrm>
+          <a:off x="0" y="0"/>
+          <a:ext cx="0" cy="0"/>
+          <a:chOff x="0" y="0"/>
+          <a:chExt cx="0" cy="0"/>
+        </a:xfrm>
+      </p:grpSpPr>
+      <p:sp>
+        <p:nvSpPr>
+          <p:cNvPr id="2" name="Title 1">
+            <a:extLst>
+              <a:ext uri="{FF2B5EF4-FFF2-40B4-BE49-F238E27FC236}">
+                <a16:creationId xmlns:a16="http://schemas.microsoft.com/office/drawing/2014/main" id="{B3E0762C-3E4E-4E5B-BC04-55322D9E4095}"/>
+              </a:ext>
+            </a:extLst>
+          </p:cNvPr>
+          <p:cNvSpPr>
+            <a:spLocks noGrp="1"/>
+          </p:cNvSpPr>
+          <p:nvPr>
+            <p:ph type="title"/>
+          </p:nvPr>
+        </p:nvSpPr>
+        <p:spPr>
+          <a:xfrm>
+            <a:off x="772886" y="365125"/>
+            <a:ext cx="10515600" cy="829193"/>
+          </a:xfrm>
+        </p:spPr>
+        <p:txBody>
+          <a:bodyPr/>
+          <a:lstStyle/>
+          <a:p>
+            <a:r>
+              <a:rPr lang="en-US" b="1" dirty="0" err="1"/>
               <a:t>Phương</a:t>
             </a:r>
             <a:r>
@@ -7020,7 +6771,7 @@
           <a:p>
             <a:fld id="{35D51119-8157-4B7F-903F-73E30443DBF0}" type="slidenum">
               <a:rPr lang="en-US" smtClean="0"/>
-              <a:t>6</a:t>
+              <a:t>7</a:t>
             </a:fld>
             <a:endParaRPr lang="en-US"/>
           </a:p>
@@ -7030,6 +6781,362 @@
     <p:extLst>
       <p:ext uri="{BB962C8B-B14F-4D97-AF65-F5344CB8AC3E}">
         <p14:creationId xmlns:p14="http://schemas.microsoft.com/office/powerpoint/2010/main" val="631175322"/>
+      </p:ext>
+    </p:extLst>
+  </p:cSld>
+  <p:clrMapOvr>
+    <a:masterClrMapping/>
+  </p:clrMapOvr>
+</p:sld>
+</file>
+
+<file path=ppt/slides/slide8.xml><?xml version="1.0" encoding="utf-8"?>
+<p:sld xmlns:a="http://schemas.openxmlformats.org/drawingml/2006/main" xmlns:r="http://schemas.openxmlformats.org/officeDocument/2006/relationships" xmlns:p="http://schemas.openxmlformats.org/presentationml/2006/main">
+  <p:cSld>
+    <p:spTree>
+      <p:nvGrpSpPr>
+        <p:cNvPr id="1" name=""/>
+        <p:cNvGrpSpPr/>
+        <p:nvPr/>
+      </p:nvGrpSpPr>
+      <p:grpSpPr>
+        <a:xfrm>
+          <a:off x="0" y="0"/>
+          <a:ext cx="0" cy="0"/>
+          <a:chOff x="0" y="0"/>
+          <a:chExt cx="0" cy="0"/>
+        </a:xfrm>
+      </p:grpSpPr>
+      <p:sp>
+        <p:nvSpPr>
+          <p:cNvPr id="4" name="Slide Number Placeholder 3">
+            <a:extLst>
+              <a:ext uri="{FF2B5EF4-FFF2-40B4-BE49-F238E27FC236}">
+                <a16:creationId xmlns:a16="http://schemas.microsoft.com/office/drawing/2014/main" id="{BD634DC6-3986-49AF-A11D-10C6B79CE56A}"/>
+              </a:ext>
+            </a:extLst>
+          </p:cNvPr>
+          <p:cNvSpPr>
+            <a:spLocks noGrp="1"/>
+          </p:cNvSpPr>
+          <p:nvPr>
+            <p:ph type="sldNum" sz="quarter" idx="12"/>
+          </p:nvPr>
+        </p:nvSpPr>
+        <p:spPr/>
+        <p:txBody>
+          <a:bodyPr/>
+          <a:lstStyle/>
+          <a:p>
+            <a:fld id="{35D51119-8157-4B7F-903F-73E30443DBF0}" type="slidenum">
+              <a:rPr lang="en-US" smtClean="0"/>
+              <a:t>8</a:t>
+            </a:fld>
+            <a:endParaRPr lang="en-US"/>
+          </a:p>
+        </p:txBody>
+      </p:sp>
+      <p:pic>
+        <p:nvPicPr>
+          <p:cNvPr id="6" name="Picture 5">
+            <a:extLst>
+              <a:ext uri="{FF2B5EF4-FFF2-40B4-BE49-F238E27FC236}">
+                <a16:creationId xmlns:a16="http://schemas.microsoft.com/office/drawing/2014/main" id="{6D36FB8B-EE79-4335-B185-F8F11D463F1B}"/>
+              </a:ext>
+            </a:extLst>
+          </p:cNvPr>
+          <p:cNvPicPr>
+            <a:picLocks noChangeAspect="1"/>
+          </p:cNvPicPr>
+          <p:nvPr/>
+        </p:nvPicPr>
+        <p:blipFill rotWithShape="1">
+          <a:blip r:embed="rId2"/>
+          <a:srcRect l="651" t="2826" r="704" b="3084"/>
+          <a:stretch/>
+        </p:blipFill>
+        <p:spPr>
+          <a:xfrm>
+            <a:off x="662470" y="2042676"/>
+            <a:ext cx="11140753" cy="3713584"/>
+          </a:xfrm>
+          <a:prstGeom prst="rect">
+            <a:avLst/>
+          </a:prstGeom>
+        </p:spPr>
+      </p:pic>
+      <p:sp>
+        <p:nvSpPr>
+          <p:cNvPr id="9" name="Title 1">
+            <a:extLst>
+              <a:ext uri="{FF2B5EF4-FFF2-40B4-BE49-F238E27FC236}">
+                <a16:creationId xmlns:a16="http://schemas.microsoft.com/office/drawing/2014/main" id="{B4F131FE-92BD-4165-9240-5F00EFD44F1E}"/>
+              </a:ext>
+            </a:extLst>
+          </p:cNvPr>
+          <p:cNvSpPr>
+            <a:spLocks noGrp="1"/>
+          </p:cNvSpPr>
+          <p:nvPr>
+            <p:ph type="title"/>
+          </p:nvPr>
+        </p:nvSpPr>
+        <p:spPr>
+          <a:xfrm>
+            <a:off x="603748" y="325928"/>
+            <a:ext cx="10515600" cy="829193"/>
+          </a:xfrm>
+        </p:spPr>
+        <p:txBody>
+          <a:bodyPr/>
+          <a:lstStyle/>
+          <a:p>
+            <a:r>
+              <a:rPr lang="en-US" b="1" dirty="0" err="1"/>
+              <a:t>Phương</a:t>
+            </a:r>
+            <a:r>
+              <a:rPr lang="en-US" b="1" dirty="0"/>
+              <a:t> </a:t>
+            </a:r>
+            <a:r>
+              <a:rPr lang="en-US" b="1" dirty="0" err="1"/>
+              <a:t>án</a:t>
+            </a:r>
+            <a:r>
+              <a:rPr lang="en-US" b="1" dirty="0"/>
+              <a:t> </a:t>
+            </a:r>
+            <a:r>
+              <a:rPr lang="en-US" b="1" dirty="0" err="1"/>
+              <a:t>giải</a:t>
+            </a:r>
+            <a:r>
+              <a:rPr lang="en-US" b="1" dirty="0"/>
+              <a:t> </a:t>
+            </a:r>
+            <a:r>
+              <a:rPr lang="en-US" b="1" dirty="0" err="1"/>
+              <a:t>quyết</a:t>
+            </a:r>
+            <a:r>
+              <a:rPr lang="en-US" b="1" dirty="0"/>
+              <a:t> </a:t>
+            </a:r>
+            <a:r>
+              <a:rPr lang="en-US" b="1" dirty="0" err="1"/>
+              <a:t>và</a:t>
+            </a:r>
+            <a:r>
+              <a:rPr lang="en-US" b="1" dirty="0"/>
+              <a:t> </a:t>
+            </a:r>
+            <a:r>
+              <a:rPr lang="en-US" b="1" dirty="0" err="1"/>
+              <a:t>kế</a:t>
+            </a:r>
+            <a:r>
+              <a:rPr lang="en-US" b="1" dirty="0"/>
+              <a:t> </a:t>
+            </a:r>
+            <a:r>
+              <a:rPr lang="en-US" b="1" dirty="0" err="1"/>
+              <a:t>hoạch</a:t>
+            </a:r>
+            <a:r>
+              <a:rPr lang="en-US" b="1" dirty="0"/>
+              <a:t> </a:t>
+            </a:r>
+            <a:r>
+              <a:rPr lang="en-US" b="1" dirty="0" err="1"/>
+              <a:t>tiếp</a:t>
+            </a:r>
+            <a:r>
+              <a:rPr lang="en-US" b="1" dirty="0"/>
+              <a:t> </a:t>
+            </a:r>
+            <a:r>
+              <a:rPr lang="en-US" b="1" dirty="0" err="1"/>
+              <a:t>theo.</a:t>
+            </a:r>
+            <a:endParaRPr lang="en-US" b="1" dirty="0"/>
+          </a:p>
+        </p:txBody>
+      </p:sp>
+      <p:sp>
+        <p:nvSpPr>
+          <p:cNvPr id="11" name="TextBox 10">
+            <a:extLst>
+              <a:ext uri="{FF2B5EF4-FFF2-40B4-BE49-F238E27FC236}">
+                <a16:creationId xmlns:a16="http://schemas.microsoft.com/office/drawing/2014/main" id="{E47E0363-7B07-4721-8288-9229C487C803}"/>
+              </a:ext>
+            </a:extLst>
+          </p:cNvPr>
+          <p:cNvSpPr txBox="1"/>
+          <p:nvPr/>
+        </p:nvSpPr>
+        <p:spPr>
+          <a:xfrm>
+            <a:off x="192947" y="1299456"/>
+            <a:ext cx="6039900" cy="400110"/>
+          </a:xfrm>
+          <a:prstGeom prst="rect">
+            <a:avLst/>
+          </a:prstGeom>
+          <a:noFill/>
+        </p:spPr>
+        <p:txBody>
+          <a:bodyPr wrap="square">
+            <a:spAutoFit/>
+          </a:bodyPr>
+          <a:lstStyle/>
+          <a:p>
+            <a:pPr marL="800100" lvl="1" indent="-342900">
+              <a:buFont typeface="Courier New" panose="02070309020205020404" pitchFamily="49" charset="0"/>
+              <a:buChar char="o"/>
+            </a:pPr>
+            <a:r>
+              <a:rPr lang="en-US" sz="2000" dirty="0">
+                <a:latin typeface="Arial" panose="020B0604020202020204" pitchFamily="34" charset="0"/>
+                <a:cs typeface="Arial" panose="020B0604020202020204" pitchFamily="34" charset="0"/>
+              </a:rPr>
+              <a:t>Update timeline mới:</a:t>
+            </a:r>
+          </a:p>
+        </p:txBody>
+      </p:sp>
+      <p:sp>
+        <p:nvSpPr>
+          <p:cNvPr id="12" name="TextBox 11">
+            <a:extLst>
+              <a:ext uri="{FF2B5EF4-FFF2-40B4-BE49-F238E27FC236}">
+                <a16:creationId xmlns:a16="http://schemas.microsoft.com/office/drawing/2014/main" id="{1C72BE97-9463-4866-B758-7AC43C105280}"/>
+              </a:ext>
+            </a:extLst>
+          </p:cNvPr>
+          <p:cNvSpPr txBox="1"/>
+          <p:nvPr/>
+        </p:nvSpPr>
+        <p:spPr>
+          <a:xfrm>
+            <a:off x="2975295" y="6099370"/>
+            <a:ext cx="6241409" cy="646331"/>
+          </a:xfrm>
+          <a:prstGeom prst="rect">
+            <a:avLst/>
+          </a:prstGeom>
+          <a:noFill/>
+        </p:spPr>
+        <p:txBody>
+          <a:bodyPr wrap="square" rtlCol="0">
+            <a:spAutoFit/>
+          </a:bodyPr>
+          <a:lstStyle/>
+          <a:p>
+            <a:pPr algn="ctr"/>
+            <a:r>
+              <a:rPr lang="en-US" i="1" dirty="0" err="1"/>
+              <a:t>Hình</a:t>
+            </a:r>
+            <a:r>
+              <a:rPr lang="en-US" i="1" dirty="0"/>
+              <a:t> 3: </a:t>
+            </a:r>
+            <a:r>
+              <a:rPr lang="en-US" i="1" dirty="0" err="1"/>
+              <a:t>Hình</a:t>
+            </a:r>
+            <a:r>
+              <a:rPr lang="en-US" i="1" dirty="0"/>
+              <a:t> </a:t>
+            </a:r>
+            <a:r>
+              <a:rPr lang="en-US" i="1" dirty="0" err="1"/>
+              <a:t>ảnh</a:t>
+            </a:r>
+            <a:r>
+              <a:rPr lang="en-US" i="1" dirty="0"/>
+              <a:t> </a:t>
+            </a:r>
+            <a:r>
+              <a:rPr lang="en-US" i="1" dirty="0" err="1"/>
+              <a:t>miêu</a:t>
+            </a:r>
+            <a:r>
+              <a:rPr lang="en-US" i="1" dirty="0"/>
+              <a:t> </a:t>
+            </a:r>
+            <a:r>
+              <a:rPr lang="en-US" i="1" dirty="0" err="1"/>
+              <a:t>tả</a:t>
+            </a:r>
+            <a:r>
+              <a:rPr lang="en-US" i="1" dirty="0"/>
+              <a:t> </a:t>
+            </a:r>
+            <a:r>
+              <a:rPr lang="en-US" i="1" dirty="0" err="1"/>
+              <a:t>bản</a:t>
+            </a:r>
+            <a:r>
+              <a:rPr lang="en-US" i="1" dirty="0"/>
+              <a:t> update timeline </a:t>
+            </a:r>
+            <a:r>
+              <a:rPr lang="en-US" i="1" dirty="0" err="1"/>
+              <a:t>dự</a:t>
+            </a:r>
+            <a:r>
+              <a:rPr lang="en-US" i="1" dirty="0"/>
+              <a:t> </a:t>
+            </a:r>
+            <a:r>
+              <a:rPr lang="en-US" i="1" dirty="0" err="1"/>
+              <a:t>kiến</a:t>
+            </a:r>
+            <a:r>
+              <a:rPr lang="en-US" i="1" dirty="0"/>
+              <a:t> </a:t>
+            </a:r>
+            <a:r>
+              <a:rPr lang="en-US" i="1" dirty="0" err="1"/>
+              <a:t>cho</a:t>
+            </a:r>
+            <a:r>
+              <a:rPr lang="en-US" i="1" dirty="0"/>
+              <a:t> </a:t>
+            </a:r>
+            <a:r>
+              <a:rPr lang="en-US" i="1" dirty="0" err="1"/>
+              <a:t>thời</a:t>
+            </a:r>
+            <a:r>
+              <a:rPr lang="en-US" i="1" dirty="0"/>
+              <a:t> </a:t>
+            </a:r>
+            <a:r>
+              <a:rPr lang="en-US" i="1" dirty="0" err="1"/>
+              <a:t>gian</a:t>
+            </a:r>
+            <a:r>
+              <a:rPr lang="en-US" i="1" dirty="0"/>
+              <a:t> </a:t>
+            </a:r>
+            <a:r>
+              <a:rPr lang="en-US" i="1" dirty="0" err="1"/>
+              <a:t>tới</a:t>
+            </a:r>
+            <a:r>
+              <a:rPr lang="en-US" dirty="0"/>
+              <a:t>.</a:t>
+            </a:r>
+          </a:p>
+        </p:txBody>
+      </p:sp>
+    </p:spTree>
+    <p:extLst>
+      <p:ext uri="{BB962C8B-B14F-4D97-AF65-F5344CB8AC3E}">
+        <p14:creationId xmlns:p14="http://schemas.microsoft.com/office/powerpoint/2010/main" val="4142596229"/>
       </p:ext>
     </p:extLst>
   </p:cSld>

</xml_diff>